<commit_message>
Add Tutorial 4 slides
</commit_message>
<xml_diff>
--- a/Tutorial 4/Tutorial 4 - GCD and Modulo Arithmetic.pptx
+++ b/Tutorial 4/Tutorial 4 - GCD and Modulo Arithmetic.pptx
@@ -9,10 +9,13 @@
     <p:sldId id="258" r:id="rId3"/>
     <p:sldId id="259" r:id="rId4"/>
     <p:sldId id="260" r:id="rId5"/>
-    <p:sldId id="262" r:id="rId6"/>
-    <p:sldId id="261" r:id="rId7"/>
+    <p:sldId id="261" r:id="rId6"/>
+    <p:sldId id="262" r:id="rId7"/>
     <p:sldId id="263" r:id="rId8"/>
     <p:sldId id="264" r:id="rId9"/>
+    <p:sldId id="265" r:id="rId10"/>
+    <p:sldId id="266" r:id="rId11"/>
+    <p:sldId id="267" r:id="rId12"/>
   </p:sldIdLst>
   <p:sldSz cx="12192000" cy="6858000"/>
   <p:notesSz cx="6858000" cy="9144000"/>
@@ -345,7 +348,7 @@
           <a:p>
             <a:fld id="{4F1121E5-844A-48A0-AEA1-923C9811B672}" type="datetimeFigureOut">
               <a:rPr lang="en-MY" smtClean="0"/>
-              <a:t>10/9/2018</a:t>
+              <a:t>17/9/2018</a:t>
             </a:fld>
             <a:endParaRPr lang="en-MY"/>
           </a:p>
@@ -553,7 +556,7 @@
           <a:p>
             <a:fld id="{4F1121E5-844A-48A0-AEA1-923C9811B672}" type="datetimeFigureOut">
               <a:rPr lang="en-MY" smtClean="0"/>
-              <a:t>10/9/2018</a:t>
+              <a:t>17/9/2018</a:t>
             </a:fld>
             <a:endParaRPr lang="en-MY"/>
           </a:p>
@@ -809,7 +812,7 @@
           <a:p>
             <a:fld id="{4F1121E5-844A-48A0-AEA1-923C9811B672}" type="datetimeFigureOut">
               <a:rPr lang="en-MY" smtClean="0"/>
-              <a:t>10/9/2018</a:t>
+              <a:t>17/9/2018</a:t>
             </a:fld>
             <a:endParaRPr lang="en-MY"/>
           </a:p>
@@ -979,7 +982,7 @@
           <a:p>
             <a:fld id="{4F1121E5-844A-48A0-AEA1-923C9811B672}" type="datetimeFigureOut">
               <a:rPr lang="en-MY" smtClean="0"/>
-              <a:t>10/9/2018</a:t>
+              <a:t>17/9/2018</a:t>
             </a:fld>
             <a:endParaRPr lang="en-MY"/>
           </a:p>
@@ -1322,7 +1325,7 @@
           <a:p>
             <a:fld id="{4F1121E5-844A-48A0-AEA1-923C9811B672}" type="datetimeFigureOut">
               <a:rPr lang="en-MY" smtClean="0"/>
-              <a:t>10/9/2018</a:t>
+              <a:t>17/9/2018</a:t>
             </a:fld>
             <a:endParaRPr lang="en-MY"/>
           </a:p>
@@ -1597,7 +1600,7 @@
           <a:p>
             <a:fld id="{4F1121E5-844A-48A0-AEA1-923C9811B672}" type="datetimeFigureOut">
               <a:rPr lang="en-MY" smtClean="0"/>
-              <a:t>10/9/2018</a:t>
+              <a:t>17/9/2018</a:t>
             </a:fld>
             <a:endParaRPr lang="en-MY"/>
           </a:p>
@@ -1976,7 +1979,7 @@
           <a:p>
             <a:fld id="{4F1121E5-844A-48A0-AEA1-923C9811B672}" type="datetimeFigureOut">
               <a:rPr lang="en-MY" smtClean="0"/>
-              <a:t>10/9/2018</a:t>
+              <a:t>17/9/2018</a:t>
             </a:fld>
             <a:endParaRPr lang="en-MY"/>
           </a:p>
@@ -2094,7 +2097,7 @@
           <a:p>
             <a:fld id="{4F1121E5-844A-48A0-AEA1-923C9811B672}" type="datetimeFigureOut">
               <a:rPr lang="en-MY" smtClean="0"/>
-              <a:t>10/9/2018</a:t>
+              <a:t>17/9/2018</a:t>
             </a:fld>
             <a:endParaRPr lang="en-MY"/>
           </a:p>
@@ -2265,7 +2268,7 @@
           <a:p>
             <a:fld id="{4F1121E5-844A-48A0-AEA1-923C9811B672}" type="datetimeFigureOut">
               <a:rPr lang="en-MY" smtClean="0"/>
-              <a:t>10/9/2018</a:t>
+              <a:t>17/9/2018</a:t>
             </a:fld>
             <a:endParaRPr lang="en-MY"/>
           </a:p>
@@ -2619,7 +2622,7 @@
           <a:p>
             <a:fld id="{4F1121E5-844A-48A0-AEA1-923C9811B672}" type="datetimeFigureOut">
               <a:rPr lang="en-MY" smtClean="0"/>
-              <a:t>10/9/2018</a:t>
+              <a:t>17/9/2018</a:t>
             </a:fld>
             <a:endParaRPr lang="en-MY"/>
           </a:p>
@@ -2996,7 +2999,7 @@
           <a:p>
             <a:fld id="{4F1121E5-844A-48A0-AEA1-923C9811B672}" type="datetimeFigureOut">
               <a:rPr lang="en-MY" smtClean="0"/>
-              <a:t>10/9/2018</a:t>
+              <a:t>17/9/2018</a:t>
             </a:fld>
             <a:endParaRPr lang="en-MY"/>
           </a:p>
@@ -3283,7 +3286,7 @@
           <a:p>
             <a:fld id="{4F1121E5-844A-48A0-AEA1-923C9811B672}" type="datetimeFigureOut">
               <a:rPr lang="en-MY" smtClean="0"/>
-              <a:t>10/9/2018</a:t>
+              <a:t>17/9/2018</a:t>
             </a:fld>
             <a:endParaRPr lang="en-MY"/>
           </a:p>
@@ -3830,7 +3833,7 @@
           <a:p>
             <a:r>
               <a:rPr lang="en-MY" dirty="0"/>
-              <a:t>CS1231 Tutorial 3</a:t>
+              <a:t>CS1231 Tutorial 4	</a:t>
             </a:r>
           </a:p>
         </p:txBody>
@@ -3858,7 +3861,7 @@
           <a:p>
             <a:r>
               <a:rPr lang="en-MY" dirty="0"/>
-              <a:t>AY18/19 – WEEK 4</a:t>
+              <a:t>AY18/19 – WEEK 6</a:t>
             </a:r>
           </a:p>
           <a:p>
@@ -3876,6 +3879,737 @@
     <p:extLst>
       <p:ext uri="{BB962C8B-B14F-4D97-AF65-F5344CB8AC3E}">
         <p14:creationId xmlns:p14="http://schemas.microsoft.com/office/powerpoint/2010/main" val="245678424"/>
+      </p:ext>
+    </p:extLst>
+  </p:cSld>
+  <p:clrMapOvr>
+    <a:masterClrMapping/>
+  </p:clrMapOvr>
+</p:sld>
+</file>
+
+<file path=ppt/slides/slide10.xml><?xml version="1.0" encoding="utf-8"?>
+<p:sld xmlns:a="http://schemas.openxmlformats.org/drawingml/2006/main" xmlns:r="http://schemas.openxmlformats.org/officeDocument/2006/relationships" xmlns:p="http://schemas.openxmlformats.org/presentationml/2006/main">
+  <p:cSld>
+    <p:spTree>
+      <p:nvGrpSpPr>
+        <p:cNvPr id="1" name=""/>
+        <p:cNvGrpSpPr/>
+        <p:nvPr/>
+      </p:nvGrpSpPr>
+      <p:grpSpPr>
+        <a:xfrm>
+          <a:off x="0" y="0"/>
+          <a:ext cx="0" cy="0"/>
+          <a:chOff x="0" y="0"/>
+          <a:chExt cx="0" cy="0"/>
+        </a:xfrm>
+      </p:grpSpPr>
+      <p:sp>
+        <p:nvSpPr>
+          <p:cNvPr id="2" name="Title 1">
+            <a:extLst>
+              <a:ext uri="{FF2B5EF4-FFF2-40B4-BE49-F238E27FC236}">
+                <a16:creationId xmlns:a16="http://schemas.microsoft.com/office/drawing/2014/main" id="{0BF8A6EA-C888-49ED-91A0-8DB4D9E5D06A}"/>
+              </a:ext>
+            </a:extLst>
+          </p:cNvPr>
+          <p:cNvSpPr>
+            <a:spLocks noGrp="1"/>
+          </p:cNvSpPr>
+          <p:nvPr>
+            <p:ph type="title"/>
+          </p:nvPr>
+        </p:nvSpPr>
+        <p:spPr/>
+        <p:txBody>
+          <a:bodyPr/>
+          <a:lstStyle/>
+          <a:p>
+            <a:r>
+              <a:rPr lang="en-MY" dirty="0"/>
+              <a:t>Modulo Inverses</a:t>
+            </a:r>
+          </a:p>
+        </p:txBody>
+      </p:sp>
+      <mc:AlternateContent xmlns:mc="http://schemas.openxmlformats.org/markup-compatibility/2006">
+        <mc:Choice xmlns:a14="http://schemas.microsoft.com/office/drawing/2010/main" Requires="a14">
+          <p:sp>
+            <p:nvSpPr>
+              <p:cNvPr id="3" name="Content Placeholder 2">
+                <a:extLst>
+                  <a:ext uri="{FF2B5EF4-FFF2-40B4-BE49-F238E27FC236}">
+                    <a16:creationId xmlns:a16="http://schemas.microsoft.com/office/drawing/2014/main" id="{18468980-FB3A-4E54-9AA9-46B542342893}"/>
+                  </a:ext>
+                </a:extLst>
+              </p:cNvPr>
+              <p:cNvSpPr>
+                <a:spLocks noGrp="1"/>
+              </p:cNvSpPr>
+              <p:nvPr>
+                <p:ph idx="1"/>
+              </p:nvPr>
+            </p:nvSpPr>
+            <p:spPr/>
+            <p:txBody>
+              <a:bodyPr>
+                <a:normAutofit/>
+              </a:bodyPr>
+              <a:lstStyle/>
+              <a:p>
+                <a:r>
+                  <a:rPr lang="en-US" sz="3000" dirty="0"/>
+                  <a:t>For any integers </a:t>
+                </a:r>
+                <a14:m>
+                  <m:oMath xmlns:m="http://schemas.openxmlformats.org/officeDocument/2006/math">
+                    <m:r>
+                      <a:rPr lang="en-US" sz="3000" i="1" dirty="0" smtClean="0">
+                        <a:latin typeface="Cambria Math" panose="02040503050406030204" pitchFamily="18" charset="0"/>
+                      </a:rPr>
+                      <m:t>𝑎</m:t>
+                    </m:r>
+                    <m:r>
+                      <a:rPr lang="en-US" sz="3000" i="1" dirty="0" smtClean="0">
+                        <a:latin typeface="Cambria Math" panose="02040503050406030204" pitchFamily="18" charset="0"/>
+                      </a:rPr>
+                      <m:t>, </m:t>
+                    </m:r>
+                    <m:r>
+                      <a:rPr lang="en-US" sz="3000" i="1" dirty="0">
+                        <a:latin typeface="Cambria Math" panose="02040503050406030204" pitchFamily="18" charset="0"/>
+                      </a:rPr>
+                      <m:t>𝑛</m:t>
+                    </m:r>
+                    <m:r>
+                      <a:rPr lang="en-US" sz="3000" i="1" dirty="0">
+                        <a:latin typeface="Cambria Math" panose="02040503050406030204" pitchFamily="18" charset="0"/>
+                      </a:rPr>
+                      <m:t> </m:t>
+                    </m:r>
+                  </m:oMath>
+                </a14:m>
+                <a:r>
+                  <a:rPr lang="en-US" sz="3000" dirty="0"/>
+                  <a:t>with </a:t>
+                </a:r>
+                <a14:m>
+                  <m:oMath xmlns:m="http://schemas.openxmlformats.org/officeDocument/2006/math">
+                    <m:r>
+                      <a:rPr lang="en-US" sz="3000" i="1" dirty="0" smtClean="0">
+                        <a:latin typeface="Cambria Math" panose="02040503050406030204" pitchFamily="18" charset="0"/>
+                      </a:rPr>
+                      <m:t>𝑛</m:t>
+                    </m:r>
+                    <m:r>
+                      <a:rPr lang="en-US" sz="3000" i="1" dirty="0" smtClean="0">
+                        <a:latin typeface="Cambria Math" panose="02040503050406030204" pitchFamily="18" charset="0"/>
+                      </a:rPr>
+                      <m:t> &gt; 1</m:t>
+                    </m:r>
+                  </m:oMath>
+                </a14:m>
+                <a:r>
+                  <a:rPr lang="en-US" sz="3000" dirty="0"/>
+                  <a:t>, if an integer </a:t>
+                </a:r>
+                <a14:m>
+                  <m:oMath xmlns:m="http://schemas.openxmlformats.org/officeDocument/2006/math">
+                    <m:r>
+                      <a:rPr lang="en-US" sz="3000" i="1" dirty="0" smtClean="0">
+                        <a:latin typeface="Cambria Math" panose="02040503050406030204" pitchFamily="18" charset="0"/>
+                      </a:rPr>
+                      <m:t>𝑠</m:t>
+                    </m:r>
+                  </m:oMath>
+                </a14:m>
+                <a:r>
+                  <a:rPr lang="en-US" sz="3000" dirty="0"/>
+                  <a:t> is such that </a:t>
+                </a:r>
+              </a:p>
+              <a:p>
+                <a14:m>
+                  <m:oMath xmlns:m="http://schemas.openxmlformats.org/officeDocument/2006/math">
+                    <m:r>
+                      <a:rPr lang="en-US" sz="3000" i="1" dirty="0" smtClean="0">
+                        <a:latin typeface="Cambria Math" panose="02040503050406030204" pitchFamily="18" charset="0"/>
+                      </a:rPr>
+                      <m:t>𝑎𝑠</m:t>
+                    </m:r>
+                    <m:r>
+                      <a:rPr lang="en-MY" sz="3000" b="0" i="1" dirty="0" smtClean="0">
+                        <a:latin typeface="Cambria Math" panose="02040503050406030204" pitchFamily="18" charset="0"/>
+                      </a:rPr>
+                      <m:t>≡</m:t>
+                    </m:r>
+                    <m:r>
+                      <a:rPr lang="en-US" sz="3000" i="1" dirty="0" smtClean="0">
+                        <a:latin typeface="Cambria Math" panose="02040503050406030204" pitchFamily="18" charset="0"/>
+                      </a:rPr>
+                      <m:t> </m:t>
+                    </m:r>
+                    <m:r>
+                      <a:rPr lang="en-US" sz="3000" i="1" dirty="0">
+                        <a:latin typeface="Cambria Math" panose="02040503050406030204" pitchFamily="18" charset="0"/>
+                      </a:rPr>
+                      <m:t>1 </m:t>
+                    </m:r>
+                  </m:oMath>
+                </a14:m>
+                <a:r>
+                  <a:rPr lang="en-US" sz="3000" dirty="0"/>
+                  <a:t>(mod </a:t>
+                </a:r>
+                <a14:m>
+                  <m:oMath xmlns:m="http://schemas.openxmlformats.org/officeDocument/2006/math">
+                    <m:r>
+                      <a:rPr lang="en-US" sz="3000" i="1" dirty="0" smtClean="0">
+                        <a:latin typeface="Cambria Math" panose="02040503050406030204" pitchFamily="18" charset="0"/>
+                      </a:rPr>
+                      <m:t>𝑛</m:t>
+                    </m:r>
+                  </m:oMath>
+                </a14:m>
+                <a:r>
+                  <a:rPr lang="en-US" sz="3000" dirty="0"/>
+                  <a:t>), then </a:t>
+                </a:r>
+                <a14:m>
+                  <m:oMath xmlns:m="http://schemas.openxmlformats.org/officeDocument/2006/math">
+                    <m:r>
+                      <a:rPr lang="en-US" sz="3000" i="1" dirty="0" smtClean="0">
+                        <a:latin typeface="Cambria Math" panose="02040503050406030204" pitchFamily="18" charset="0"/>
+                      </a:rPr>
+                      <m:t>𝑠</m:t>
+                    </m:r>
+                  </m:oMath>
+                </a14:m>
+                <a:r>
+                  <a:rPr lang="en-US" sz="3000" dirty="0"/>
+                  <a:t> is called the multiplicative inverse of </a:t>
+                </a:r>
+              </a:p>
+              <a:p>
+                <a14:m>
+                  <m:oMath xmlns:m="http://schemas.openxmlformats.org/officeDocument/2006/math">
+                    <m:r>
+                      <a:rPr lang="en-US" sz="3000" i="1" dirty="0" smtClean="0">
+                        <a:latin typeface="Cambria Math" panose="02040503050406030204" pitchFamily="18" charset="0"/>
+                      </a:rPr>
+                      <m:t>𝑎</m:t>
+                    </m:r>
+                    <m:r>
+                      <a:rPr lang="en-US" sz="3000" i="1" dirty="0" smtClean="0">
+                        <a:latin typeface="Cambria Math" panose="02040503050406030204" pitchFamily="18" charset="0"/>
+                      </a:rPr>
+                      <m:t> </m:t>
+                    </m:r>
+                    <m:r>
+                      <a:rPr lang="en-US" sz="3000" i="1" dirty="0">
+                        <a:latin typeface="Cambria Math" panose="02040503050406030204" pitchFamily="18" charset="0"/>
+                      </a:rPr>
+                      <m:t>𝑚𝑜𝑑𝑢𝑙𝑜</m:t>
+                    </m:r>
+                    <m:r>
+                      <a:rPr lang="en-US" sz="3000" i="1" dirty="0">
+                        <a:latin typeface="Cambria Math" panose="02040503050406030204" pitchFamily="18" charset="0"/>
+                      </a:rPr>
+                      <m:t> </m:t>
+                    </m:r>
+                    <m:r>
+                      <a:rPr lang="en-US" sz="3000" i="1" dirty="0">
+                        <a:latin typeface="Cambria Math" panose="02040503050406030204" pitchFamily="18" charset="0"/>
+                      </a:rPr>
+                      <m:t>𝑛</m:t>
+                    </m:r>
+                  </m:oMath>
+                </a14:m>
+                <a:r>
+                  <a:rPr lang="en-US" sz="3000" dirty="0"/>
+                  <a:t>. We may write the inverse as </a:t>
+                </a:r>
+                <a14:m>
+                  <m:oMath xmlns:m="http://schemas.openxmlformats.org/officeDocument/2006/math">
+                    <m:sSup>
+                      <m:sSupPr>
+                        <m:ctrlPr>
+                          <a:rPr lang="en-MY" sz="3000" b="0" i="1" smtClean="0">
+                            <a:latin typeface="Cambria Math" panose="02040503050406030204" pitchFamily="18" charset="0"/>
+                          </a:rPr>
+                        </m:ctrlPr>
+                      </m:sSupPr>
+                      <m:e>
+                        <m:r>
+                          <a:rPr lang="en-MY" sz="3000" b="0" i="1" smtClean="0">
+                            <a:latin typeface="Cambria Math" panose="02040503050406030204" pitchFamily="18" charset="0"/>
+                          </a:rPr>
+                          <m:t>𝑎</m:t>
+                        </m:r>
+                      </m:e>
+                      <m:sup>
+                        <m:r>
+                          <a:rPr lang="en-MY" sz="3000" b="0" i="1" smtClean="0">
+                            <a:latin typeface="Cambria Math" panose="02040503050406030204" pitchFamily="18" charset="0"/>
+                          </a:rPr>
+                          <m:t>−1</m:t>
+                        </m:r>
+                      </m:sup>
+                    </m:sSup>
+                  </m:oMath>
+                </a14:m>
+                <a:r>
+                  <a:rPr lang="en-US" sz="3000" dirty="0"/>
+                  <a:t>.</a:t>
+                </a:r>
+                <a:endParaRPr lang="en-MY" sz="3000" dirty="0"/>
+              </a:p>
+            </p:txBody>
+          </p:sp>
+        </mc:Choice>
+        <mc:Fallback>
+          <p:sp>
+            <p:nvSpPr>
+              <p:cNvPr id="3" name="Content Placeholder 2">
+                <a:extLst>
+                  <a:ext uri="{FF2B5EF4-FFF2-40B4-BE49-F238E27FC236}">
+                    <a16:creationId xmlns:a16="http://schemas.microsoft.com/office/drawing/2014/main" id="{18468980-FB3A-4E54-9AA9-46B542342893}"/>
+                  </a:ext>
+                </a:extLst>
+              </p:cNvPr>
+              <p:cNvSpPr>
+                <a:spLocks noGrp="1" noRot="1" noChangeAspect="1" noMove="1" noResize="1" noEditPoints="1" noAdjustHandles="1" noChangeArrowheads="1" noChangeShapeType="1" noTextEdit="1"/>
+              </p:cNvSpPr>
+              <p:nvPr>
+                <p:ph idx="1"/>
+              </p:nvPr>
+            </p:nvSpPr>
+            <p:spPr>
+              <a:blipFill>
+                <a:blip r:embed="rId2"/>
+                <a:stretch>
+                  <a:fillRect l="-1394" t="-3030"/>
+                </a:stretch>
+              </a:blipFill>
+            </p:spPr>
+            <p:txBody>
+              <a:bodyPr/>
+              <a:lstStyle/>
+              <a:p>
+                <a:r>
+                  <a:rPr lang="en-MY">
+                    <a:noFill/>
+                  </a:rPr>
+                  <a:t> </a:t>
+                </a:r>
+              </a:p>
+            </p:txBody>
+          </p:sp>
+        </mc:Fallback>
+      </mc:AlternateContent>
+    </p:spTree>
+    <p:extLst>
+      <p:ext uri="{BB962C8B-B14F-4D97-AF65-F5344CB8AC3E}">
+        <p14:creationId xmlns:p14="http://schemas.microsoft.com/office/powerpoint/2010/main" val="3904421482"/>
+      </p:ext>
+    </p:extLst>
+  </p:cSld>
+  <p:clrMapOvr>
+    <a:masterClrMapping/>
+  </p:clrMapOvr>
+</p:sld>
+</file>
+
+<file path=ppt/slides/slide11.xml><?xml version="1.0" encoding="utf-8"?>
+<p:sld xmlns:a="http://schemas.openxmlformats.org/drawingml/2006/main" xmlns:r="http://schemas.openxmlformats.org/officeDocument/2006/relationships" xmlns:p="http://schemas.openxmlformats.org/presentationml/2006/main">
+  <p:cSld>
+    <p:spTree>
+      <p:nvGrpSpPr>
+        <p:cNvPr id="1" name=""/>
+        <p:cNvGrpSpPr/>
+        <p:nvPr/>
+      </p:nvGrpSpPr>
+      <p:grpSpPr>
+        <a:xfrm>
+          <a:off x="0" y="0"/>
+          <a:ext cx="0" cy="0"/>
+          <a:chOff x="0" y="0"/>
+          <a:chExt cx="0" cy="0"/>
+        </a:xfrm>
+      </p:grpSpPr>
+      <p:sp>
+        <p:nvSpPr>
+          <p:cNvPr id="2" name="Title 1">
+            <a:extLst>
+              <a:ext uri="{FF2B5EF4-FFF2-40B4-BE49-F238E27FC236}">
+                <a16:creationId xmlns:a16="http://schemas.microsoft.com/office/drawing/2014/main" id="{0BF8A6EA-C888-49ED-91A0-8DB4D9E5D06A}"/>
+              </a:ext>
+            </a:extLst>
+          </p:cNvPr>
+          <p:cNvSpPr>
+            <a:spLocks noGrp="1"/>
+          </p:cNvSpPr>
+          <p:nvPr>
+            <p:ph type="title"/>
+          </p:nvPr>
+        </p:nvSpPr>
+        <p:spPr/>
+        <p:txBody>
+          <a:bodyPr/>
+          <a:lstStyle/>
+          <a:p>
+            <a:r>
+              <a:rPr lang="en-MY" dirty="0"/>
+              <a:t>Modulo Inverses</a:t>
+            </a:r>
+          </a:p>
+        </p:txBody>
+      </p:sp>
+      <mc:AlternateContent xmlns:mc="http://schemas.openxmlformats.org/markup-compatibility/2006">
+        <mc:Choice xmlns:a14="http://schemas.microsoft.com/office/drawing/2010/main" Requires="a14">
+          <p:sp>
+            <p:nvSpPr>
+              <p:cNvPr id="3" name="Content Placeholder 2">
+                <a:extLst>
+                  <a:ext uri="{FF2B5EF4-FFF2-40B4-BE49-F238E27FC236}">
+                    <a16:creationId xmlns:a16="http://schemas.microsoft.com/office/drawing/2014/main" id="{18468980-FB3A-4E54-9AA9-46B542342893}"/>
+                  </a:ext>
+                </a:extLst>
+              </p:cNvPr>
+              <p:cNvSpPr>
+                <a:spLocks noGrp="1"/>
+              </p:cNvSpPr>
+              <p:nvPr>
+                <p:ph idx="1"/>
+              </p:nvPr>
+            </p:nvSpPr>
+            <p:spPr/>
+            <p:txBody>
+              <a:bodyPr>
+                <a:normAutofit/>
+              </a:bodyPr>
+              <a:lstStyle/>
+              <a:p>
+                <a:r>
+                  <a:rPr lang="en-US" sz="3000" dirty="0"/>
+                  <a:t>For any integers </a:t>
+                </a:r>
+                <a14:m>
+                  <m:oMath xmlns:m="http://schemas.openxmlformats.org/officeDocument/2006/math">
+                    <m:r>
+                      <a:rPr lang="en-US" sz="3000" i="1" dirty="0" smtClean="0">
+                        <a:latin typeface="Cambria Math" panose="02040503050406030204" pitchFamily="18" charset="0"/>
+                      </a:rPr>
+                      <m:t>𝑎</m:t>
+                    </m:r>
+                    <m:r>
+                      <a:rPr lang="en-US" sz="3000" i="1" dirty="0" smtClean="0">
+                        <a:latin typeface="Cambria Math" panose="02040503050406030204" pitchFamily="18" charset="0"/>
+                      </a:rPr>
+                      <m:t>, </m:t>
+                    </m:r>
+                    <m:r>
+                      <a:rPr lang="en-US" sz="3000" i="1" dirty="0">
+                        <a:latin typeface="Cambria Math" panose="02040503050406030204" pitchFamily="18" charset="0"/>
+                      </a:rPr>
+                      <m:t>𝑛</m:t>
+                    </m:r>
+                    <m:r>
+                      <a:rPr lang="en-US" sz="3000" i="1" dirty="0">
+                        <a:latin typeface="Cambria Math" panose="02040503050406030204" pitchFamily="18" charset="0"/>
+                      </a:rPr>
+                      <m:t> </m:t>
+                    </m:r>
+                  </m:oMath>
+                </a14:m>
+                <a:r>
+                  <a:rPr lang="en-US" sz="3000" dirty="0"/>
+                  <a:t>with </a:t>
+                </a:r>
+                <a14:m>
+                  <m:oMath xmlns:m="http://schemas.openxmlformats.org/officeDocument/2006/math">
+                    <m:r>
+                      <a:rPr lang="en-US" sz="3000" i="1" dirty="0" smtClean="0">
+                        <a:latin typeface="Cambria Math" panose="02040503050406030204" pitchFamily="18" charset="0"/>
+                      </a:rPr>
+                      <m:t>𝑛</m:t>
+                    </m:r>
+                    <m:r>
+                      <a:rPr lang="en-US" sz="3000" i="1" dirty="0" smtClean="0">
+                        <a:latin typeface="Cambria Math" panose="02040503050406030204" pitchFamily="18" charset="0"/>
+                      </a:rPr>
+                      <m:t> &gt; 1</m:t>
+                    </m:r>
+                  </m:oMath>
+                </a14:m>
+                <a:r>
+                  <a:rPr lang="en-US" sz="3000" dirty="0"/>
+                  <a:t>, if an integer </a:t>
+                </a:r>
+                <a14:m>
+                  <m:oMath xmlns:m="http://schemas.openxmlformats.org/officeDocument/2006/math">
+                    <m:r>
+                      <a:rPr lang="en-US" sz="3000" i="1" dirty="0" smtClean="0">
+                        <a:latin typeface="Cambria Math" panose="02040503050406030204" pitchFamily="18" charset="0"/>
+                      </a:rPr>
+                      <m:t>𝑠</m:t>
+                    </m:r>
+                  </m:oMath>
+                </a14:m>
+                <a:r>
+                  <a:rPr lang="en-US" sz="3000" dirty="0"/>
+                  <a:t> is such that </a:t>
+                </a:r>
+              </a:p>
+              <a:p>
+                <a14:m>
+                  <m:oMath xmlns:m="http://schemas.openxmlformats.org/officeDocument/2006/math">
+                    <m:r>
+                      <a:rPr lang="en-US" sz="3000" i="1" dirty="0" smtClean="0">
+                        <a:latin typeface="Cambria Math" panose="02040503050406030204" pitchFamily="18" charset="0"/>
+                      </a:rPr>
+                      <m:t>𝑎𝑠</m:t>
+                    </m:r>
+                    <m:r>
+                      <a:rPr lang="en-MY" sz="3000" b="0" i="1" dirty="0" smtClean="0">
+                        <a:latin typeface="Cambria Math" panose="02040503050406030204" pitchFamily="18" charset="0"/>
+                      </a:rPr>
+                      <m:t>≡</m:t>
+                    </m:r>
+                    <m:r>
+                      <a:rPr lang="en-US" sz="3000" i="1" dirty="0" smtClean="0">
+                        <a:latin typeface="Cambria Math" panose="02040503050406030204" pitchFamily="18" charset="0"/>
+                      </a:rPr>
+                      <m:t> </m:t>
+                    </m:r>
+                    <m:r>
+                      <a:rPr lang="en-US" sz="3000" i="1" dirty="0">
+                        <a:latin typeface="Cambria Math" panose="02040503050406030204" pitchFamily="18" charset="0"/>
+                      </a:rPr>
+                      <m:t>1 </m:t>
+                    </m:r>
+                  </m:oMath>
+                </a14:m>
+                <a:r>
+                  <a:rPr lang="en-US" sz="3000" dirty="0"/>
+                  <a:t>(mod </a:t>
+                </a:r>
+                <a14:m>
+                  <m:oMath xmlns:m="http://schemas.openxmlformats.org/officeDocument/2006/math">
+                    <m:r>
+                      <a:rPr lang="en-US" sz="3000" i="1" dirty="0" smtClean="0">
+                        <a:latin typeface="Cambria Math" panose="02040503050406030204" pitchFamily="18" charset="0"/>
+                      </a:rPr>
+                      <m:t>𝑛</m:t>
+                    </m:r>
+                  </m:oMath>
+                </a14:m>
+                <a:r>
+                  <a:rPr lang="en-US" sz="3000" dirty="0"/>
+                  <a:t>), then </a:t>
+                </a:r>
+                <a14:m>
+                  <m:oMath xmlns:m="http://schemas.openxmlformats.org/officeDocument/2006/math">
+                    <m:r>
+                      <a:rPr lang="en-US" sz="3000" i="1" dirty="0" smtClean="0">
+                        <a:latin typeface="Cambria Math" panose="02040503050406030204" pitchFamily="18" charset="0"/>
+                      </a:rPr>
+                      <m:t>𝑠</m:t>
+                    </m:r>
+                  </m:oMath>
+                </a14:m>
+                <a:r>
+                  <a:rPr lang="en-US" sz="3000" dirty="0"/>
+                  <a:t> is called the multiplicative inverse of </a:t>
+                </a:r>
+              </a:p>
+              <a:p>
+                <a14:m>
+                  <m:oMath xmlns:m="http://schemas.openxmlformats.org/officeDocument/2006/math">
+                    <m:r>
+                      <a:rPr lang="en-US" sz="3000" i="1" dirty="0" smtClean="0">
+                        <a:latin typeface="Cambria Math" panose="02040503050406030204" pitchFamily="18" charset="0"/>
+                      </a:rPr>
+                      <m:t>𝑎</m:t>
+                    </m:r>
+                    <m:r>
+                      <a:rPr lang="en-US" sz="3000" i="1" dirty="0" smtClean="0">
+                        <a:latin typeface="Cambria Math" panose="02040503050406030204" pitchFamily="18" charset="0"/>
+                      </a:rPr>
+                      <m:t> </m:t>
+                    </m:r>
+                    <m:r>
+                      <a:rPr lang="en-US" sz="3000" i="1" dirty="0">
+                        <a:latin typeface="Cambria Math" panose="02040503050406030204" pitchFamily="18" charset="0"/>
+                      </a:rPr>
+                      <m:t>𝑚𝑜𝑑𝑢𝑙𝑜</m:t>
+                    </m:r>
+                    <m:r>
+                      <a:rPr lang="en-US" sz="3000" i="1" dirty="0">
+                        <a:latin typeface="Cambria Math" panose="02040503050406030204" pitchFamily="18" charset="0"/>
+                      </a:rPr>
+                      <m:t> </m:t>
+                    </m:r>
+                    <m:r>
+                      <a:rPr lang="en-US" sz="3000" i="1" dirty="0">
+                        <a:latin typeface="Cambria Math" panose="02040503050406030204" pitchFamily="18" charset="0"/>
+                      </a:rPr>
+                      <m:t>𝑛</m:t>
+                    </m:r>
+                  </m:oMath>
+                </a14:m>
+                <a:r>
+                  <a:rPr lang="en-US" sz="3000" dirty="0"/>
+                  <a:t>. We may write the inverse as </a:t>
+                </a:r>
+                <a14:m>
+                  <m:oMath xmlns:m="http://schemas.openxmlformats.org/officeDocument/2006/math">
+                    <m:sSup>
+                      <m:sSupPr>
+                        <m:ctrlPr>
+                          <a:rPr lang="en-MY" sz="3000" b="0" i="1" smtClean="0">
+                            <a:latin typeface="Cambria Math" panose="02040503050406030204" pitchFamily="18" charset="0"/>
+                          </a:rPr>
+                        </m:ctrlPr>
+                      </m:sSupPr>
+                      <m:e>
+                        <m:r>
+                          <a:rPr lang="en-MY" sz="3000" b="0" i="1" smtClean="0">
+                            <a:latin typeface="Cambria Math" panose="02040503050406030204" pitchFamily="18" charset="0"/>
+                          </a:rPr>
+                          <m:t>𝑎</m:t>
+                        </m:r>
+                      </m:e>
+                      <m:sup>
+                        <m:r>
+                          <a:rPr lang="en-MY" sz="3000" b="0" i="1" smtClean="0">
+                            <a:latin typeface="Cambria Math" panose="02040503050406030204" pitchFamily="18" charset="0"/>
+                          </a:rPr>
+                          <m:t>−1</m:t>
+                        </m:r>
+                      </m:sup>
+                    </m:sSup>
+                  </m:oMath>
+                </a14:m>
+                <a:r>
+                  <a:rPr lang="en-US" sz="3000" dirty="0"/>
+                  <a:t>.</a:t>
+                </a:r>
+              </a:p>
+              <a:p>
+                <a:endParaRPr lang="en-US" sz="3000" dirty="0"/>
+              </a:p>
+              <a:p>
+                <a14:m>
+                  <m:oMath xmlns:m="http://schemas.openxmlformats.org/officeDocument/2006/math">
+                    <m:sSup>
+                      <m:sSupPr>
+                        <m:ctrlPr>
+                          <a:rPr lang="en-MY" sz="3000" b="0" i="1" smtClean="0">
+                            <a:latin typeface="Cambria Math" panose="02040503050406030204" pitchFamily="18" charset="0"/>
+                          </a:rPr>
+                        </m:ctrlPr>
+                      </m:sSupPr>
+                      <m:e>
+                        <m:r>
+                          <a:rPr lang="en-MY" sz="3000" b="0" i="1" smtClean="0">
+                            <a:latin typeface="Cambria Math" panose="02040503050406030204" pitchFamily="18" charset="0"/>
+                          </a:rPr>
+                          <m:t>𝑎</m:t>
+                        </m:r>
+                      </m:e>
+                      <m:sup>
+                        <m:r>
+                          <a:rPr lang="en-MY" sz="3000" b="0" i="1" smtClean="0">
+                            <a:latin typeface="Cambria Math" panose="02040503050406030204" pitchFamily="18" charset="0"/>
+                          </a:rPr>
+                          <m:t>−1</m:t>
+                        </m:r>
+                      </m:sup>
+                    </m:sSup>
+                  </m:oMath>
+                </a14:m>
+                <a:r>
+                  <a:rPr lang="en-MY" sz="3000" dirty="0"/>
+                  <a:t> exists if and only if </a:t>
+                </a:r>
+                <a14:m>
+                  <m:oMath xmlns:m="http://schemas.openxmlformats.org/officeDocument/2006/math">
+                    <m:r>
+                      <a:rPr lang="en-MY" sz="3000" b="0" i="1" smtClean="0">
+                        <a:latin typeface="Cambria Math" panose="02040503050406030204" pitchFamily="18" charset="0"/>
+                      </a:rPr>
+                      <m:t>𝑎</m:t>
+                    </m:r>
+                  </m:oMath>
+                </a14:m>
+                <a:r>
+                  <a:rPr lang="en-MY" sz="3000" dirty="0"/>
+                  <a:t> and </a:t>
+                </a:r>
+                <a14:m>
+                  <m:oMath xmlns:m="http://schemas.openxmlformats.org/officeDocument/2006/math">
+                    <m:r>
+                      <a:rPr lang="en-MY" sz="3000" b="0" i="1" smtClean="0">
+                        <a:latin typeface="Cambria Math" panose="02040503050406030204" pitchFamily="18" charset="0"/>
+                      </a:rPr>
+                      <m:t>𝑛</m:t>
+                    </m:r>
+                  </m:oMath>
+                </a14:m>
+                <a:r>
+                  <a:rPr lang="en-MY" sz="3000" dirty="0"/>
+                  <a:t> are coprime.</a:t>
+                </a:r>
+              </a:p>
+            </p:txBody>
+          </p:sp>
+        </mc:Choice>
+        <mc:Fallback>
+          <p:sp>
+            <p:nvSpPr>
+              <p:cNvPr id="3" name="Content Placeholder 2">
+                <a:extLst>
+                  <a:ext uri="{FF2B5EF4-FFF2-40B4-BE49-F238E27FC236}">
+                    <a16:creationId xmlns:a16="http://schemas.microsoft.com/office/drawing/2014/main" id="{18468980-FB3A-4E54-9AA9-46B542342893}"/>
+                  </a:ext>
+                </a:extLst>
+              </p:cNvPr>
+              <p:cNvSpPr>
+                <a:spLocks noGrp="1" noRot="1" noChangeAspect="1" noMove="1" noResize="1" noEditPoints="1" noAdjustHandles="1" noChangeArrowheads="1" noChangeShapeType="1" noTextEdit="1"/>
+              </p:cNvSpPr>
+              <p:nvPr>
+                <p:ph idx="1"/>
+              </p:nvPr>
+            </p:nvSpPr>
+            <p:spPr>
+              <a:blipFill>
+                <a:blip r:embed="rId2"/>
+                <a:stretch>
+                  <a:fillRect l="-1394" t="-3030"/>
+                </a:stretch>
+              </a:blipFill>
+            </p:spPr>
+            <p:txBody>
+              <a:bodyPr/>
+              <a:lstStyle/>
+              <a:p>
+                <a:r>
+                  <a:rPr lang="en-MY">
+                    <a:noFill/>
+                  </a:rPr>
+                  <a:t> </a:t>
+                </a:r>
+              </a:p>
+            </p:txBody>
+          </p:sp>
+        </mc:Fallback>
+      </mc:AlternateContent>
+    </p:spTree>
+    <p:extLst>
+      <p:ext uri="{BB962C8B-B14F-4D97-AF65-F5344CB8AC3E}">
+        <p14:creationId xmlns:p14="http://schemas.microsoft.com/office/powerpoint/2010/main" val="4214018913"/>
       </p:ext>
     </p:extLst>
   </p:cSld>
@@ -3925,282 +4659,62 @@
           <a:p>
             <a:r>
               <a:rPr lang="en-MY" dirty="0"/>
-              <a:t>Mathematical Induction</a:t>
-            </a:r>
-          </a:p>
-        </p:txBody>
-      </p:sp>
-      <mc:AlternateContent xmlns:mc="http://schemas.openxmlformats.org/markup-compatibility/2006" xmlns:a14="http://schemas.microsoft.com/office/drawing/2010/main">
-        <mc:Choice Requires="a14">
-          <p:sp>
-            <p:nvSpPr>
-              <p:cNvPr id="3" name="Content Placeholder 2">
-                <a:extLst>
-                  <a:ext uri="{FF2B5EF4-FFF2-40B4-BE49-F238E27FC236}">
-                    <a16:creationId xmlns:a16="http://schemas.microsoft.com/office/drawing/2014/main" id="{7A200C48-F6E6-438D-8B6C-3933FFD4DEBF}"/>
-                  </a:ext>
-                </a:extLst>
-              </p:cNvPr>
-              <p:cNvSpPr>
-                <a:spLocks noGrp="1"/>
-              </p:cNvSpPr>
-              <p:nvPr>
-                <p:ph idx="1"/>
-              </p:nvPr>
-            </p:nvSpPr>
-            <p:spPr/>
-            <p:txBody>
-              <a:bodyPr>
-                <a:normAutofit/>
-              </a:bodyPr>
-              <a:lstStyle/>
-              <a:p>
-                <a:r>
-                  <a:rPr lang="en-MY" sz="3200" dirty="0"/>
-                  <a:t>Given a predicate P(n):</a:t>
-                </a:r>
-              </a:p>
-              <a:p>
-                <a:r>
-                  <a:rPr lang="en-MY" sz="3200" dirty="0"/>
-                  <a:t>Base case:          P(0)</a:t>
-                </a:r>
-              </a:p>
-              <a:p>
-                <a:r>
-                  <a:rPr lang="en-MY" sz="3200" dirty="0"/>
-                  <a:t>Inductive Step:  </a:t>
-                </a:r>
-                <a14:m>
-                  <m:oMath xmlns:m="http://schemas.openxmlformats.org/officeDocument/2006/math">
-                    <m:r>
-                      <a:rPr lang="en-MY" sz="3200" b="0" i="1" smtClean="0">
-                        <a:latin typeface="Cambria Math" panose="02040503050406030204" pitchFamily="18" charset="0"/>
-                      </a:rPr>
-                      <m:t>∀</m:t>
-                    </m:r>
-                    <m:r>
-                      <a:rPr lang="en-MY" sz="3200" b="0" i="1" smtClean="0">
-                        <a:latin typeface="Cambria Math" panose="02040503050406030204" pitchFamily="18" charset="0"/>
-                      </a:rPr>
-                      <m:t>𝑘</m:t>
-                    </m:r>
-                    <m:r>
-                      <a:rPr lang="en-MY" sz="3200" b="0" i="1" smtClean="0">
-                        <a:latin typeface="Cambria Math" panose="02040503050406030204" pitchFamily="18" charset="0"/>
-                      </a:rPr>
-                      <m:t>∈ </m:t>
-                    </m:r>
-                    <m:r>
-                      <a:rPr lang="en-MY" sz="3200" b="0" i="1" smtClean="0">
-                        <a:latin typeface="Cambria Math" panose="02040503050406030204" pitchFamily="18" charset="0"/>
-                        <a:ea typeface="Cambria Math" panose="02040503050406030204" pitchFamily="18" charset="0"/>
-                      </a:rPr>
-                      <m:t>ℕ</m:t>
-                    </m:r>
-                    <m:r>
-                      <a:rPr lang="en-MY" sz="3200" b="0" i="1" smtClean="0">
-                        <a:latin typeface="Cambria Math" panose="02040503050406030204" pitchFamily="18" charset="0"/>
-                        <a:ea typeface="Cambria Math" panose="02040503050406030204" pitchFamily="18" charset="0"/>
-                      </a:rPr>
-                      <m:t>, </m:t>
-                    </m:r>
-                    <m:r>
-                      <a:rPr lang="en-MY" sz="3200" b="0" i="1" smtClean="0">
-                        <a:latin typeface="Cambria Math" panose="02040503050406030204" pitchFamily="18" charset="0"/>
-                        <a:ea typeface="Cambria Math" panose="02040503050406030204" pitchFamily="18" charset="0"/>
-                      </a:rPr>
-                      <m:t>𝑃</m:t>
-                    </m:r>
-                    <m:d>
-                      <m:dPr>
-                        <m:ctrlPr>
-                          <a:rPr lang="en-MY" sz="3200" b="0" i="1" smtClean="0">
-                            <a:latin typeface="Cambria Math" panose="02040503050406030204" pitchFamily="18" charset="0"/>
-                            <a:ea typeface="Cambria Math" panose="02040503050406030204" pitchFamily="18" charset="0"/>
-                          </a:rPr>
-                        </m:ctrlPr>
-                      </m:dPr>
-                      <m:e>
-                        <m:r>
-                          <a:rPr lang="en-MY" sz="3200" b="0" i="1" smtClean="0">
-                            <a:latin typeface="Cambria Math" panose="02040503050406030204" pitchFamily="18" charset="0"/>
-                            <a:ea typeface="Cambria Math" panose="02040503050406030204" pitchFamily="18" charset="0"/>
-                          </a:rPr>
-                          <m:t>𝑘</m:t>
-                        </m:r>
-                      </m:e>
-                    </m:d>
-                    <m:r>
-                      <a:rPr lang="en-MY" sz="3200" b="0" i="1" smtClean="0">
-                        <a:latin typeface="Cambria Math" panose="02040503050406030204" pitchFamily="18" charset="0"/>
-                        <a:ea typeface="Cambria Math" panose="02040503050406030204" pitchFamily="18" charset="0"/>
-                      </a:rPr>
-                      <m:t>→</m:t>
-                    </m:r>
-                    <m:r>
-                      <a:rPr lang="en-MY" sz="3200" b="0" i="1" smtClean="0">
-                        <a:latin typeface="Cambria Math" panose="02040503050406030204" pitchFamily="18" charset="0"/>
-                        <a:ea typeface="Cambria Math" panose="02040503050406030204" pitchFamily="18" charset="0"/>
-                      </a:rPr>
-                      <m:t>𝑃</m:t>
-                    </m:r>
-                    <m:d>
-                      <m:dPr>
-                        <m:ctrlPr>
-                          <a:rPr lang="en-MY" sz="3200" b="0" i="1" smtClean="0">
-                            <a:latin typeface="Cambria Math" panose="02040503050406030204" pitchFamily="18" charset="0"/>
-                            <a:ea typeface="Cambria Math" panose="02040503050406030204" pitchFamily="18" charset="0"/>
-                          </a:rPr>
-                        </m:ctrlPr>
-                      </m:dPr>
-                      <m:e>
-                        <m:r>
-                          <a:rPr lang="en-MY" sz="3200" b="0" i="1" smtClean="0">
-                            <a:latin typeface="Cambria Math" panose="02040503050406030204" pitchFamily="18" charset="0"/>
-                            <a:ea typeface="Cambria Math" panose="02040503050406030204" pitchFamily="18" charset="0"/>
-                          </a:rPr>
-                          <m:t>𝑘</m:t>
-                        </m:r>
-                        <m:r>
-                          <a:rPr lang="en-MY" sz="3200" b="0" i="1" smtClean="0">
-                            <a:latin typeface="Cambria Math" panose="02040503050406030204" pitchFamily="18" charset="0"/>
-                            <a:ea typeface="Cambria Math" panose="02040503050406030204" pitchFamily="18" charset="0"/>
-                          </a:rPr>
-                          <m:t>+1</m:t>
-                        </m:r>
-                      </m:e>
-                    </m:d>
-                  </m:oMath>
-                </a14:m>
-                <a:endParaRPr lang="en-MY" sz="3200" b="0" dirty="0">
-                  <a:ea typeface="Cambria Math" panose="02040503050406030204" pitchFamily="18" charset="0"/>
-                </a:endParaRPr>
-              </a:p>
-              <a:p>
-                <a:r>
-                  <a:rPr lang="en-MY" sz="3200" b="0" dirty="0">
-                    <a:ea typeface="Cambria Math" panose="02040503050406030204" pitchFamily="18" charset="0"/>
-                  </a:rPr>
-                  <a:t>Conclusion:        </a:t>
-                </a:r>
-                <a14:m>
-                  <m:oMath xmlns:m="http://schemas.openxmlformats.org/officeDocument/2006/math">
-                    <m:r>
-                      <a:rPr lang="en-MY" sz="3200" i="1">
-                        <a:latin typeface="Cambria Math" panose="02040503050406030204" pitchFamily="18" charset="0"/>
-                        <a:ea typeface="Cambria Math" panose="02040503050406030204" pitchFamily="18" charset="0"/>
-                      </a:rPr>
-                      <m:t>∙∀</m:t>
-                    </m:r>
-                    <m:r>
-                      <a:rPr lang="en-MY" sz="3200" i="1">
-                        <a:latin typeface="Cambria Math" panose="02040503050406030204" pitchFamily="18" charset="0"/>
-                        <a:ea typeface="Cambria Math" panose="02040503050406030204" pitchFamily="18" charset="0"/>
-                      </a:rPr>
-                      <m:t>𝑛</m:t>
-                    </m:r>
-                    <m:r>
-                      <a:rPr lang="en-MY" sz="3200" i="1">
-                        <a:latin typeface="Cambria Math" panose="02040503050406030204" pitchFamily="18" charset="0"/>
-                        <a:ea typeface="Cambria Math" panose="02040503050406030204" pitchFamily="18" charset="0"/>
-                      </a:rPr>
-                      <m:t>∈</m:t>
-                    </m:r>
-                    <m:r>
-                      <a:rPr lang="en-MY" sz="3200" i="1">
-                        <a:latin typeface="Cambria Math" panose="02040503050406030204" pitchFamily="18" charset="0"/>
-                        <a:ea typeface="Cambria Math" panose="02040503050406030204" pitchFamily="18" charset="0"/>
-                      </a:rPr>
-                      <m:t>ℕ</m:t>
-                    </m:r>
-                    <m:r>
-                      <a:rPr lang="en-MY" sz="3200" i="1">
-                        <a:latin typeface="Cambria Math" panose="02040503050406030204" pitchFamily="18" charset="0"/>
-                        <a:ea typeface="Cambria Math" panose="02040503050406030204" pitchFamily="18" charset="0"/>
-                      </a:rPr>
-                      <m:t>, </m:t>
-                    </m:r>
-                    <m:r>
-                      <a:rPr lang="en-MY" sz="3200" i="1">
-                        <a:latin typeface="Cambria Math" panose="02040503050406030204" pitchFamily="18" charset="0"/>
-                        <a:ea typeface="Cambria Math" panose="02040503050406030204" pitchFamily="18" charset="0"/>
-                      </a:rPr>
-                      <m:t>𝑃</m:t>
-                    </m:r>
-                    <m:r>
-                      <a:rPr lang="en-MY" sz="3200" i="1">
-                        <a:latin typeface="Cambria Math" panose="02040503050406030204" pitchFamily="18" charset="0"/>
-                        <a:ea typeface="Cambria Math" panose="02040503050406030204" pitchFamily="18" charset="0"/>
-                      </a:rPr>
-                      <m:t>(</m:t>
-                    </m:r>
-                    <m:r>
-                      <a:rPr lang="en-MY" sz="3200" i="1">
-                        <a:latin typeface="Cambria Math" panose="02040503050406030204" pitchFamily="18" charset="0"/>
-                        <a:ea typeface="Cambria Math" panose="02040503050406030204" pitchFamily="18" charset="0"/>
-                      </a:rPr>
-                      <m:t>𝑛</m:t>
-                    </m:r>
-                    <m:r>
-                      <a:rPr lang="en-MY" sz="3200" i="1">
-                        <a:latin typeface="Cambria Math" panose="02040503050406030204" pitchFamily="18" charset="0"/>
-                        <a:ea typeface="Cambria Math" panose="02040503050406030204" pitchFamily="18" charset="0"/>
-                      </a:rPr>
-                      <m:t>)</m:t>
-                    </m:r>
-                  </m:oMath>
-                </a14:m>
-                <a:endParaRPr lang="en-MY" sz="3200" b="0" dirty="0">
-                  <a:ea typeface="Cambria Math" panose="02040503050406030204" pitchFamily="18" charset="0"/>
-                </a:endParaRPr>
-              </a:p>
-              <a:p>
-                <a:endParaRPr lang="en-MY" sz="3200" dirty="0"/>
-              </a:p>
-            </p:txBody>
-          </p:sp>
-        </mc:Choice>
-        <mc:Fallback xmlns="">
-          <p:sp>
-            <p:nvSpPr>
-              <p:cNvPr id="3" name="Content Placeholder 2">
-                <a:extLst>
-                  <a:ext uri="{FF2B5EF4-FFF2-40B4-BE49-F238E27FC236}">
-                    <a16:creationId xmlns:a16="http://schemas.microsoft.com/office/drawing/2014/main" id="{7A200C48-F6E6-438D-8B6C-3933FFD4DEBF}"/>
-                  </a:ext>
-                </a:extLst>
-              </p:cNvPr>
-              <p:cNvSpPr>
-                <a:spLocks noGrp="1" noRot="1" noChangeAspect="1" noMove="1" noResize="1" noEditPoints="1" noAdjustHandles="1" noChangeArrowheads="1" noChangeShapeType="1" noTextEdit="1"/>
-              </p:cNvSpPr>
-              <p:nvPr>
-                <p:ph idx="1"/>
-              </p:nvPr>
-            </p:nvSpPr>
-            <p:spPr>
-              <a:blipFill>
-                <a:blip r:embed="rId2"/>
-                <a:stretch>
-                  <a:fillRect l="-1515" t="-3182"/>
-                </a:stretch>
-              </a:blipFill>
-            </p:spPr>
-            <p:txBody>
-              <a:bodyPr/>
-              <a:lstStyle/>
-              <a:p>
-                <a:r>
-                  <a:rPr lang="en-MY">
-                    <a:noFill/>
-                  </a:rPr>
-                  <a:t> </a:t>
-                </a:r>
-              </a:p>
-            </p:txBody>
-          </p:sp>
-        </mc:Fallback>
-      </mc:AlternateContent>
+              <a:t>More Number Theory!</a:t>
+            </a:r>
+          </a:p>
+        </p:txBody>
+      </p:sp>
+      <p:sp>
+        <p:nvSpPr>
+          <p:cNvPr id="3" name="Content Placeholder 2">
+            <a:extLst>
+              <a:ext uri="{FF2B5EF4-FFF2-40B4-BE49-F238E27FC236}">
+                <a16:creationId xmlns:a16="http://schemas.microsoft.com/office/drawing/2014/main" id="{7A200C48-F6E6-438D-8B6C-3933FFD4DEBF}"/>
+              </a:ext>
+            </a:extLst>
+          </p:cNvPr>
+          <p:cNvSpPr>
+            <a:spLocks noGrp="1"/>
+          </p:cNvSpPr>
+          <p:nvPr>
+            <p:ph idx="1"/>
+          </p:nvPr>
+        </p:nvSpPr>
+        <p:spPr/>
+        <p:txBody>
+          <a:bodyPr>
+            <a:normAutofit/>
+          </a:bodyPr>
+          <a:lstStyle/>
+          <a:p>
+            <a:r>
+              <a:rPr lang="en-MY" sz="3200" b="0" dirty="0">
+                <a:ea typeface="Cambria Math" panose="02040503050406030204" pitchFamily="18" charset="0"/>
+              </a:rPr>
+              <a:t>1. Well Ordering Principle</a:t>
+            </a:r>
+          </a:p>
+          <a:p>
+            <a:r>
+              <a:rPr lang="en-MY" sz="3200" dirty="0">
+                <a:ea typeface="Cambria Math" panose="02040503050406030204" pitchFamily="18" charset="0"/>
+              </a:rPr>
+              <a:t>2. Greatest Common Divisor</a:t>
+            </a:r>
+          </a:p>
+          <a:p>
+            <a:r>
+              <a:rPr lang="en-MY" sz="3200" b="0" dirty="0">
+                <a:ea typeface="Cambria Math" panose="02040503050406030204" pitchFamily="18" charset="0"/>
+              </a:rPr>
+              <a:t>3. Modulo Arithmetic</a:t>
+            </a:r>
+          </a:p>
+          <a:p>
+            <a:endParaRPr lang="en-MY" sz="3200" dirty="0"/>
+          </a:p>
+        </p:txBody>
+      </p:sp>
     </p:spTree>
     <p:extLst>
       <p:ext uri="{BB962C8B-B14F-4D97-AF65-F5344CB8AC3E}">
@@ -4254,7 +4768,7 @@
           <a:p>
             <a:r>
               <a:rPr lang="en-MY" dirty="0"/>
-              <a:t>Mathematical Induction</a:t>
+              <a:t>Well Ordering Principle</a:t>
             </a:r>
           </a:p>
         </p:txBody>
@@ -4280,7 +4794,7 @@
             <p:spPr>
               <a:xfrm>
                 <a:off x="1097280" y="1845733"/>
-                <a:ext cx="10058400" cy="5815975"/>
+                <a:ext cx="10058400" cy="2986149"/>
               </a:xfrm>
             </p:spPr>
             <p:txBody>
@@ -4290,109 +4804,131 @@
               <a:lstStyle/>
               <a:p>
                 <a:r>
-                  <a:rPr lang="en-MY" sz="3200" dirty="0"/>
-                  <a:t>Writing the proof:</a:t>
-                </a:r>
+                  <a:rPr lang="en-US" sz="3000" dirty="0"/>
+                  <a:t>if a non-empty set </a:t>
+                </a:r>
+                <a14:m>
+                  <m:oMath xmlns:m="http://schemas.openxmlformats.org/officeDocument/2006/math">
+                    <m:r>
+                      <a:rPr lang="en-US" sz="3000" i="1" dirty="0" smtClean="0">
+                        <a:latin typeface="Cambria Math" panose="02040503050406030204" pitchFamily="18" charset="0"/>
+                      </a:rPr>
+                      <m:t>𝑆</m:t>
+                    </m:r>
+                    <m:r>
+                      <a:rPr lang="en-MY" sz="3000" b="0" i="1" dirty="0" smtClean="0">
+                        <a:latin typeface="Cambria Math" panose="02040503050406030204" pitchFamily="18" charset="0"/>
+                      </a:rPr>
+                      <m:t>⊆</m:t>
+                    </m:r>
+                    <m:r>
+                      <a:rPr lang="en-US" sz="3000" i="1" dirty="0" smtClean="0">
+                        <a:latin typeface="Cambria Math" panose="02040503050406030204" pitchFamily="18" charset="0"/>
+                      </a:rPr>
+                      <m:t>𝑍</m:t>
+                    </m:r>
+                    <m:r>
+                      <a:rPr lang="en-US" sz="3000" i="1" dirty="0" smtClean="0">
+                        <a:latin typeface="Cambria Math" panose="02040503050406030204" pitchFamily="18" charset="0"/>
+                      </a:rPr>
+                      <m:t> </m:t>
+                    </m:r>
+                  </m:oMath>
+                </a14:m>
+                <a:r>
+                  <a:rPr lang="en-US" sz="3000" dirty="0"/>
+                  <a:t>has a lower bound, then</a:t>
+                </a:r>
+                <a14:m>
+                  <m:oMath xmlns:m="http://schemas.openxmlformats.org/officeDocument/2006/math">
+                    <m:r>
+                      <a:rPr lang="en-US" sz="3000" i="1" dirty="0" smtClean="0">
+                        <a:latin typeface="Cambria Math" panose="02040503050406030204" pitchFamily="18" charset="0"/>
+                      </a:rPr>
+                      <m:t> </m:t>
+                    </m:r>
+                    <m:r>
+                      <a:rPr lang="en-US" sz="3000" i="1" dirty="0" smtClean="0">
+                        <a:latin typeface="Cambria Math" panose="02040503050406030204" pitchFamily="18" charset="0"/>
+                      </a:rPr>
+                      <m:t>𝑆</m:t>
+                    </m:r>
+                  </m:oMath>
+                </a14:m>
+                <a:endParaRPr lang="en-US" sz="3000" dirty="0"/>
               </a:p>
               <a:p>
                 <a:r>
-                  <a:rPr lang="en-MY" sz="3200" dirty="0"/>
-                  <a:t>1. Identify P(n)</a:t>
+                  <a:rPr lang="en-MY" sz="3000" dirty="0"/>
+                  <a:t>has a least element. </a:t>
                 </a:r>
               </a:p>
               <a:p>
-                <a:r>
-                  <a:rPr lang="en-MY" sz="3200" dirty="0"/>
-                  <a:t>2. Prove the </a:t>
-                </a:r>
-                <a:r>
-                  <a:rPr lang="en-MY" sz="3200" b="1" dirty="0"/>
-                  <a:t>Base Case</a:t>
-                </a:r>
-              </a:p>
-              <a:p>
-                <a:r>
-                  <a:rPr lang="en-MY" sz="3200" dirty="0"/>
-                  <a:t>3. Prove the </a:t>
-                </a:r>
-                <a:r>
-                  <a:rPr lang="en-MY" sz="3200" b="1" dirty="0"/>
-                  <a:t>Inductive step</a:t>
-                </a:r>
-                <a:r>
-                  <a:rPr lang="en-MY" sz="3200" dirty="0"/>
-                  <a:t>:</a:t>
-                </a:r>
-              </a:p>
-              <a:p>
-                <a:pPr lvl="1"/>
-                <a:r>
-                  <a:rPr lang="en-MY" sz="2800" dirty="0"/>
-                  <a:t>3.1. For any </a:t>
-                </a:r>
-                <a14:m>
-                  <m:oMath xmlns:m="http://schemas.openxmlformats.org/officeDocument/2006/math">
-                    <m:r>
-                      <a:rPr lang="en-MY" sz="2800" i="1">
-                        <a:latin typeface="Cambria Math" panose="02040503050406030204" pitchFamily="18" charset="0"/>
-                      </a:rPr>
-                      <m:t>𝑘</m:t>
-                    </m:r>
-                    <m:r>
-                      <a:rPr lang="en-MY" sz="2800" i="1">
-                        <a:latin typeface="Cambria Math" panose="02040503050406030204" pitchFamily="18" charset="0"/>
-                      </a:rPr>
-                      <m:t>∈</m:t>
-                    </m:r>
-                    <m:r>
-                      <a:rPr lang="en-MY" sz="2800" i="1">
-                        <a:latin typeface="Cambria Math" panose="02040503050406030204" pitchFamily="18" charset="0"/>
-                        <a:ea typeface="Cambria Math" panose="02040503050406030204" pitchFamily="18" charset="0"/>
-                      </a:rPr>
-                      <m:t>ℕ</m:t>
-                    </m:r>
-                  </m:oMath>
-                </a14:m>
                 <a:endParaRPr lang="en-MY" sz="3000" dirty="0"/>
               </a:p>
               <a:p>
-                <a:pPr lvl="1"/>
-                <a:r>
-                  <a:rPr lang="en-MY" sz="3000" dirty="0"/>
-                  <a:t>3.2 Assume P(k) is true (</a:t>
-                </a:r>
-                <a:r>
-                  <a:rPr lang="en-MY" sz="3000"/>
-                  <a:t>Inductive Hypothesis)</a:t>
-                </a:r>
-                <a:endParaRPr lang="en-MY" sz="3000" dirty="0"/>
+                <a:r>
+                  <a:rPr lang="en-US" sz="3000" dirty="0"/>
+                  <a:t>if a non-empty set </a:t>
+                </a:r>
+                <a14:m>
+                  <m:oMath xmlns:m="http://schemas.openxmlformats.org/officeDocument/2006/math">
+                    <m:r>
+                      <a:rPr lang="en-US" sz="3000" i="1" dirty="0">
+                        <a:latin typeface="Cambria Math" panose="02040503050406030204" pitchFamily="18" charset="0"/>
+                      </a:rPr>
+                      <m:t>𝑆</m:t>
+                    </m:r>
+                    <m:r>
+                      <a:rPr lang="en-MY" sz="3000" i="1" dirty="0">
+                        <a:latin typeface="Cambria Math" panose="02040503050406030204" pitchFamily="18" charset="0"/>
+                      </a:rPr>
+                      <m:t>⊆</m:t>
+                    </m:r>
+                    <m:r>
+                      <a:rPr lang="en-US" sz="3000" i="1" dirty="0">
+                        <a:latin typeface="Cambria Math" panose="02040503050406030204" pitchFamily="18" charset="0"/>
+                      </a:rPr>
+                      <m:t>𝑍</m:t>
+                    </m:r>
+                    <m:r>
+                      <a:rPr lang="en-US" sz="3000" i="1" dirty="0">
+                        <a:latin typeface="Cambria Math" panose="02040503050406030204" pitchFamily="18" charset="0"/>
+                      </a:rPr>
+                      <m:t> </m:t>
+                    </m:r>
+                  </m:oMath>
+                </a14:m>
+                <a:r>
+                  <a:rPr lang="en-US" sz="3000" dirty="0"/>
+                  <a:t>has an upper bound, then</a:t>
+                </a:r>
+                <a14:m>
+                  <m:oMath xmlns:m="http://schemas.openxmlformats.org/officeDocument/2006/math">
+                    <m:r>
+                      <a:rPr lang="en-US" sz="3000" i="1" dirty="0">
+                        <a:latin typeface="Cambria Math" panose="02040503050406030204" pitchFamily="18" charset="0"/>
+                      </a:rPr>
+                      <m:t> </m:t>
+                    </m:r>
+                    <m:r>
+                      <a:rPr lang="en-US" sz="3000" i="1" dirty="0">
+                        <a:latin typeface="Cambria Math" panose="02040503050406030204" pitchFamily="18" charset="0"/>
+                      </a:rPr>
+                      <m:t>𝑆</m:t>
+                    </m:r>
+                  </m:oMath>
+                </a14:m>
+                <a:endParaRPr lang="en-US" sz="3000" dirty="0"/>
               </a:p>
               <a:p>
-                <a:pPr lvl="1"/>
                 <a:r>
                   <a:rPr lang="en-MY" sz="3000" dirty="0"/>
-                  <a:t>…</a:t>
+                  <a:t>has a greatest element. </a:t>
                 </a:r>
               </a:p>
               <a:p>
-                <a:r>
-                  <a:rPr lang="en-MY" sz="3200" dirty="0"/>
-                  <a:t>4. Write the </a:t>
-                </a:r>
-                <a:r>
-                  <a:rPr lang="en-MY" sz="3200" b="1" dirty="0"/>
-                  <a:t>Conclusion</a:t>
-                </a:r>
                 <a:endParaRPr lang="en-MY" sz="3000" dirty="0"/>
-              </a:p>
-              <a:p>
-                <a:pPr marL="201168" lvl="1" indent="0">
-                  <a:buNone/>
-                </a:pPr>
-                <a:r>
-                  <a:rPr lang="en-MY" sz="3000" dirty="0"/>
-                  <a:t> </a:t>
-                </a:r>
               </a:p>
             </p:txBody>
           </p:sp>
@@ -4417,12 +4953,12 @@
             <p:spPr>
               <a:xfrm>
                 <a:off x="1097280" y="1845733"/>
-                <a:ext cx="10058400" cy="5815975"/>
+                <a:ext cx="10058400" cy="2986149"/>
               </a:xfrm>
               <a:blipFill>
                 <a:blip r:embed="rId2"/>
                 <a:stretch>
-                  <a:fillRect l="-1515" t="-2201"/>
+                  <a:fillRect l="-1394" t="-4082" b="-2245"/>
                 </a:stretch>
               </a:blipFill>
             </p:spPr>
@@ -4494,68 +5030,278 @@
           <a:p>
             <a:r>
               <a:rPr lang="en-MY" dirty="0"/>
-              <a:t>Strong Induction</a:t>
-            </a:r>
-          </a:p>
-        </p:txBody>
-      </p:sp>
-      <p:sp>
-        <p:nvSpPr>
-          <p:cNvPr id="3" name="Content Placeholder 2">
-            <a:extLst>
-              <a:ext uri="{FF2B5EF4-FFF2-40B4-BE49-F238E27FC236}">
-                <a16:creationId xmlns:a16="http://schemas.microsoft.com/office/drawing/2014/main" id="{821C69E7-6476-4A2D-AFEF-F2BD349B1F23}"/>
-              </a:ext>
-            </a:extLst>
-          </p:cNvPr>
-          <p:cNvSpPr>
-            <a:spLocks noGrp="1"/>
-          </p:cNvSpPr>
-          <p:nvPr>
-            <p:ph idx="1"/>
-          </p:nvPr>
-        </p:nvSpPr>
-        <p:spPr/>
-        <p:txBody>
-          <a:bodyPr>
-            <a:normAutofit/>
-          </a:bodyPr>
-          <a:lstStyle/>
-          <a:p>
-            <a:pPr marL="0" indent="0">
-              <a:buNone/>
-            </a:pPr>
-            <a:r>
-              <a:rPr lang="en-MY" sz="3200" dirty="0"/>
-              <a:t>Inductive hypothesis: </a:t>
-            </a:r>
-          </a:p>
-          <a:p>
-            <a:pPr marL="0" indent="0">
-              <a:buNone/>
-            </a:pPr>
-            <a:r>
-              <a:rPr lang="en-MY" sz="3200" dirty="0"/>
-              <a:t>Assume P(k), P(k-1), …, P(a) are all true.</a:t>
-            </a:r>
-          </a:p>
-          <a:p>
-            <a:pPr marL="0" indent="0">
-              <a:buNone/>
-            </a:pPr>
-            <a:endParaRPr lang="en-MY" sz="3200" dirty="0"/>
-          </a:p>
-          <a:p>
-            <a:pPr marL="0" indent="0">
-              <a:buNone/>
-            </a:pPr>
-            <a:r>
-              <a:rPr lang="en-MY" sz="3200" dirty="0"/>
-              <a:t>All other steps are similar to regular induction</a:t>
-            </a:r>
-          </a:p>
-        </p:txBody>
-      </p:sp>
+              <a:t>Quotient-Remainder Theorem</a:t>
+            </a:r>
+          </a:p>
+        </p:txBody>
+      </p:sp>
+      <mc:AlternateContent xmlns:mc="http://schemas.openxmlformats.org/markup-compatibility/2006">
+        <mc:Choice xmlns:a14="http://schemas.microsoft.com/office/drawing/2010/main" Requires="a14">
+          <p:sp>
+            <p:nvSpPr>
+              <p:cNvPr id="3" name="Content Placeholder 2">
+                <a:extLst>
+                  <a:ext uri="{FF2B5EF4-FFF2-40B4-BE49-F238E27FC236}">
+                    <a16:creationId xmlns:a16="http://schemas.microsoft.com/office/drawing/2014/main" id="{821C69E7-6476-4A2D-AFEF-F2BD349B1F23}"/>
+                  </a:ext>
+                </a:extLst>
+              </p:cNvPr>
+              <p:cNvSpPr>
+                <a:spLocks noGrp="1"/>
+              </p:cNvSpPr>
+              <p:nvPr>
+                <p:ph idx="1"/>
+              </p:nvPr>
+            </p:nvSpPr>
+            <p:spPr/>
+            <p:txBody>
+              <a:bodyPr>
+                <a:normAutofit/>
+              </a:bodyPr>
+              <a:lstStyle/>
+              <a:p>
+                <a:r>
+                  <a:rPr lang="en-US" sz="3000" dirty="0"/>
+                  <a:t>Given any integer</a:t>
+                </a:r>
+                <a14:m>
+                  <m:oMath xmlns:m="http://schemas.openxmlformats.org/officeDocument/2006/math">
+                    <m:r>
+                      <a:rPr lang="en-US" sz="3000" i="1" dirty="0" smtClean="0">
+                        <a:latin typeface="Cambria Math" panose="02040503050406030204" pitchFamily="18" charset="0"/>
+                      </a:rPr>
+                      <m:t> </m:t>
+                    </m:r>
+                    <m:r>
+                      <a:rPr lang="en-US" sz="3000" i="1" dirty="0" smtClean="0">
+                        <a:latin typeface="Cambria Math" panose="02040503050406030204" pitchFamily="18" charset="0"/>
+                      </a:rPr>
+                      <m:t>𝑎</m:t>
+                    </m:r>
+                    <m:r>
+                      <a:rPr lang="en-US" sz="3000" i="1" dirty="0" smtClean="0">
+                        <a:latin typeface="Cambria Math" panose="02040503050406030204" pitchFamily="18" charset="0"/>
+                      </a:rPr>
+                      <m:t> </m:t>
+                    </m:r>
+                  </m:oMath>
+                </a14:m>
+                <a:r>
+                  <a:rPr lang="en-US" sz="3000" dirty="0"/>
+                  <a:t>and any positive integer </a:t>
+                </a:r>
+                <a14:m>
+                  <m:oMath xmlns:m="http://schemas.openxmlformats.org/officeDocument/2006/math">
+                    <m:r>
+                      <a:rPr lang="en-US" sz="3000" i="1" dirty="0" smtClean="0">
+                        <a:latin typeface="Cambria Math" panose="02040503050406030204" pitchFamily="18" charset="0"/>
+                      </a:rPr>
+                      <m:t>𝑏</m:t>
+                    </m:r>
+                  </m:oMath>
+                </a14:m>
+                <a:r>
+                  <a:rPr lang="en-US" sz="3000" dirty="0"/>
+                  <a:t>, there exist unique integers</a:t>
+                </a:r>
+                <a14:m>
+                  <m:oMath xmlns:m="http://schemas.openxmlformats.org/officeDocument/2006/math">
+                    <m:r>
+                      <a:rPr lang="en-US" sz="3000" i="1" dirty="0" smtClean="0">
+                        <a:latin typeface="Cambria Math" panose="02040503050406030204" pitchFamily="18" charset="0"/>
+                      </a:rPr>
+                      <m:t> </m:t>
+                    </m:r>
+                    <m:r>
+                      <a:rPr lang="en-US" sz="3000" i="1" dirty="0" smtClean="0">
+                        <a:latin typeface="Cambria Math" panose="02040503050406030204" pitchFamily="18" charset="0"/>
+                      </a:rPr>
+                      <m:t>𝑞</m:t>
+                    </m:r>
+                    <m:r>
+                      <a:rPr lang="en-US" sz="3000" i="1" dirty="0" smtClean="0">
+                        <a:latin typeface="Cambria Math" panose="02040503050406030204" pitchFamily="18" charset="0"/>
+                      </a:rPr>
+                      <m:t> </m:t>
+                    </m:r>
+                  </m:oMath>
+                </a14:m>
+                <a:r>
+                  <a:rPr lang="en-US" sz="3000" dirty="0"/>
+                  <a:t>and </a:t>
+                </a:r>
+                <a14:m>
+                  <m:oMath xmlns:m="http://schemas.openxmlformats.org/officeDocument/2006/math">
+                    <m:r>
+                      <a:rPr lang="en-US" sz="3000" i="1" dirty="0" smtClean="0">
+                        <a:latin typeface="Cambria Math" panose="02040503050406030204" pitchFamily="18" charset="0"/>
+                      </a:rPr>
+                      <m:t>𝑟</m:t>
+                    </m:r>
+                    <m:r>
+                      <a:rPr lang="en-US" sz="3000" i="1" dirty="0" smtClean="0">
+                        <a:latin typeface="Cambria Math" panose="02040503050406030204" pitchFamily="18" charset="0"/>
+                      </a:rPr>
+                      <m:t> </m:t>
+                    </m:r>
+                  </m:oMath>
+                </a14:m>
+                <a:r>
+                  <a:rPr lang="en-US" sz="3000" dirty="0"/>
+                  <a:t>such that:</a:t>
+                </a:r>
+              </a:p>
+              <a:p>
+                <a14:m>
+                  <m:oMath xmlns:m="http://schemas.openxmlformats.org/officeDocument/2006/math">
+                    <m:r>
+                      <a:rPr lang="pt-BR" sz="3000" i="1" dirty="0" smtClean="0">
+                        <a:latin typeface="Cambria Math" panose="02040503050406030204" pitchFamily="18" charset="0"/>
+                      </a:rPr>
+                      <m:t>𝑎</m:t>
+                    </m:r>
+                    <m:r>
+                      <a:rPr lang="pt-BR" sz="3000" i="1" dirty="0" smtClean="0">
+                        <a:latin typeface="Cambria Math" panose="02040503050406030204" pitchFamily="18" charset="0"/>
+                      </a:rPr>
+                      <m:t> = </m:t>
+                    </m:r>
+                    <m:r>
+                      <a:rPr lang="pt-BR" sz="3000" i="1" dirty="0" smtClean="0">
+                        <a:latin typeface="Cambria Math" panose="02040503050406030204" pitchFamily="18" charset="0"/>
+                      </a:rPr>
+                      <m:t>𝑏𝑞</m:t>
+                    </m:r>
+                    <m:r>
+                      <a:rPr lang="pt-BR" sz="3000" i="1" dirty="0" smtClean="0">
+                        <a:latin typeface="Cambria Math" panose="02040503050406030204" pitchFamily="18" charset="0"/>
+                      </a:rPr>
+                      <m:t> + </m:t>
+                    </m:r>
+                    <m:r>
+                      <a:rPr lang="pt-BR" sz="3000" i="1" dirty="0" smtClean="0">
+                        <a:latin typeface="Cambria Math" panose="02040503050406030204" pitchFamily="18" charset="0"/>
+                      </a:rPr>
+                      <m:t>𝑟</m:t>
+                    </m:r>
+                    <m:r>
+                      <a:rPr lang="pt-BR" sz="3000" i="1" dirty="0" smtClean="0">
+                        <a:latin typeface="Cambria Math" panose="02040503050406030204" pitchFamily="18" charset="0"/>
+                      </a:rPr>
+                      <m:t> </m:t>
+                    </m:r>
+                  </m:oMath>
+                </a14:m>
+                <a:r>
+                  <a:rPr lang="pt-BR" sz="3000" dirty="0"/>
+                  <a:t>and </a:t>
+                </a:r>
+                <a14:m>
+                  <m:oMath xmlns:m="http://schemas.openxmlformats.org/officeDocument/2006/math">
+                    <m:r>
+                      <a:rPr lang="pt-BR" sz="3000" i="1" dirty="0" smtClean="0">
+                        <a:latin typeface="Cambria Math" panose="02040503050406030204" pitchFamily="18" charset="0"/>
+                      </a:rPr>
+                      <m:t>0</m:t>
+                    </m:r>
+                    <m:r>
+                      <a:rPr lang="en-MY" sz="3000" b="0" i="1" dirty="0" smtClean="0">
+                        <a:latin typeface="Cambria Math" panose="02040503050406030204" pitchFamily="18" charset="0"/>
+                      </a:rPr>
+                      <m:t>≤</m:t>
+                    </m:r>
+                    <m:r>
+                      <a:rPr lang="pt-BR" sz="3000" i="1" dirty="0" smtClean="0">
+                        <a:latin typeface="Cambria Math" panose="02040503050406030204" pitchFamily="18" charset="0"/>
+                      </a:rPr>
+                      <m:t> </m:t>
+                    </m:r>
+                    <m:r>
+                      <a:rPr lang="pt-BR" sz="3000" i="1" dirty="0" smtClean="0">
+                        <a:latin typeface="Cambria Math" panose="02040503050406030204" pitchFamily="18" charset="0"/>
+                      </a:rPr>
+                      <m:t>𝑟</m:t>
+                    </m:r>
+                    <m:r>
+                      <a:rPr lang="pt-BR" sz="3000" i="1" dirty="0" smtClean="0">
+                        <a:latin typeface="Cambria Math" panose="02040503050406030204" pitchFamily="18" charset="0"/>
+                      </a:rPr>
+                      <m:t> &lt; </m:t>
+                    </m:r>
+                    <m:r>
+                      <a:rPr lang="pt-BR" sz="3000" i="1" dirty="0" smtClean="0">
+                        <a:latin typeface="Cambria Math" panose="02040503050406030204" pitchFamily="18" charset="0"/>
+                      </a:rPr>
+                      <m:t>𝑏</m:t>
+                    </m:r>
+                  </m:oMath>
+                </a14:m>
+                <a:endParaRPr lang="pt-BR" sz="3000" dirty="0"/>
+              </a:p>
+              <a:p>
+                <a:r>
+                  <a:rPr lang="en-US" sz="3000" dirty="0"/>
+                  <a:t>The integer </a:t>
+                </a:r>
+                <a14:m>
+                  <m:oMath xmlns:m="http://schemas.openxmlformats.org/officeDocument/2006/math">
+                    <m:r>
+                      <a:rPr lang="en-US" sz="3000" i="1" dirty="0" smtClean="0">
+                        <a:latin typeface="Cambria Math" panose="02040503050406030204" pitchFamily="18" charset="0"/>
+                      </a:rPr>
+                      <m:t>𝑞</m:t>
+                    </m:r>
+                  </m:oMath>
+                </a14:m>
+                <a:r>
+                  <a:rPr lang="en-US" sz="3000" dirty="0"/>
+                  <a:t> is called the quotient, and the integer r is called the remainder.</a:t>
+                </a:r>
+                <a:endParaRPr lang="en-MY" sz="3000" dirty="0"/>
+              </a:p>
+            </p:txBody>
+          </p:sp>
+        </mc:Choice>
+        <mc:Fallback>
+          <p:sp>
+            <p:nvSpPr>
+              <p:cNvPr id="3" name="Content Placeholder 2">
+                <a:extLst>
+                  <a:ext uri="{FF2B5EF4-FFF2-40B4-BE49-F238E27FC236}">
+                    <a16:creationId xmlns:a16="http://schemas.microsoft.com/office/drawing/2014/main" id="{821C69E7-6476-4A2D-AFEF-F2BD349B1F23}"/>
+                  </a:ext>
+                </a:extLst>
+              </p:cNvPr>
+              <p:cNvSpPr>
+                <a:spLocks noGrp="1" noRot="1" noChangeAspect="1" noMove="1" noResize="1" noEditPoints="1" noAdjustHandles="1" noChangeArrowheads="1" noChangeShapeType="1" noTextEdit="1"/>
+              </p:cNvSpPr>
+              <p:nvPr>
+                <p:ph idx="1"/>
+              </p:nvPr>
+            </p:nvSpPr>
+            <p:spPr>
+              <a:blipFill>
+                <a:blip r:embed="rId2"/>
+                <a:stretch>
+                  <a:fillRect l="-1394" t="-3030"/>
+                </a:stretch>
+              </a:blipFill>
+            </p:spPr>
+            <p:txBody>
+              <a:bodyPr/>
+              <a:lstStyle/>
+              <a:p>
+                <a:r>
+                  <a:rPr lang="en-MY">
+                    <a:noFill/>
+                  </a:rPr>
+                  <a:t> </a:t>
+                </a:r>
+              </a:p>
+            </p:txBody>
+          </p:sp>
+        </mc:Fallback>
+      </mc:AlternateContent>
     </p:spTree>
     <p:extLst>
       <p:ext uri="{BB962C8B-B14F-4D97-AF65-F5344CB8AC3E}">
@@ -4591,7 +5337,7 @@
           <p:cNvPr id="2" name="Title 1">
             <a:extLst>
               <a:ext uri="{FF2B5EF4-FFF2-40B4-BE49-F238E27FC236}">
-                <a16:creationId xmlns:a16="http://schemas.microsoft.com/office/drawing/2014/main" id="{35332B01-0399-4307-99E4-FBFFC06C7A57}"/>
+                <a16:creationId xmlns:a16="http://schemas.microsoft.com/office/drawing/2014/main" id="{B4BEE58F-C367-4572-9653-C3B619926859}"/>
               </a:ext>
             </a:extLst>
           </p:cNvPr>
@@ -4609,46 +5355,394 @@
           <a:p>
             <a:r>
               <a:rPr lang="en-MY" dirty="0"/>
-              <a:t>Number Theory</a:t>
-            </a:r>
-          </a:p>
-        </p:txBody>
-      </p:sp>
-      <p:sp>
-        <p:nvSpPr>
-          <p:cNvPr id="3" name="Content Placeholder 2">
-            <a:extLst>
-              <a:ext uri="{FF2B5EF4-FFF2-40B4-BE49-F238E27FC236}">
-                <a16:creationId xmlns:a16="http://schemas.microsoft.com/office/drawing/2014/main" id="{8FE1CA4B-3A66-4942-BB9A-E153C6DEACFC}"/>
-              </a:ext>
-            </a:extLst>
-          </p:cNvPr>
-          <p:cNvSpPr>
-            <a:spLocks noGrp="1"/>
-          </p:cNvSpPr>
-          <p:nvPr>
-            <p:ph idx="1"/>
-          </p:nvPr>
-        </p:nvSpPr>
-        <p:spPr/>
-        <p:txBody>
-          <a:bodyPr>
-            <a:normAutofit/>
-          </a:bodyPr>
-          <a:lstStyle/>
-          <a:p>
-            <a:r>
-              <a:rPr lang="en-US" sz="3200" dirty="0"/>
-              <a:t>The branch of mathematics that deals with the properties and relationships of numbers, especially the positive integers.</a:t>
-            </a:r>
-            <a:endParaRPr lang="en-MY" sz="3200" dirty="0"/>
-          </a:p>
-        </p:txBody>
-      </p:sp>
+              <a:t>Greatest Common Divisor</a:t>
+            </a:r>
+          </a:p>
+        </p:txBody>
+      </p:sp>
+      <mc:AlternateContent xmlns:mc="http://schemas.openxmlformats.org/markup-compatibility/2006">
+        <mc:Choice xmlns:a14="http://schemas.microsoft.com/office/drawing/2010/main" Requires="a14">
+          <p:sp>
+            <p:nvSpPr>
+              <p:cNvPr id="3" name="Content Placeholder 2">
+                <a:extLst>
+                  <a:ext uri="{FF2B5EF4-FFF2-40B4-BE49-F238E27FC236}">
+                    <a16:creationId xmlns:a16="http://schemas.microsoft.com/office/drawing/2014/main" id="{821C69E7-6476-4A2D-AFEF-F2BD349B1F23}"/>
+                  </a:ext>
+                </a:extLst>
+              </p:cNvPr>
+              <p:cNvSpPr>
+                <a:spLocks noGrp="1"/>
+              </p:cNvSpPr>
+              <p:nvPr>
+                <p:ph idx="1"/>
+              </p:nvPr>
+            </p:nvSpPr>
+            <p:spPr/>
+            <p:txBody>
+              <a:bodyPr>
+                <a:normAutofit/>
+              </a:bodyPr>
+              <a:lstStyle/>
+              <a:p>
+                <a:r>
+                  <a:rPr lang="en-US" sz="3000" dirty="0"/>
+                  <a:t>Let </a:t>
+                </a:r>
+                <a14:m>
+                  <m:oMath xmlns:m="http://schemas.openxmlformats.org/officeDocument/2006/math">
+                    <m:r>
+                      <a:rPr lang="en-US" sz="3000" i="1" dirty="0" smtClean="0">
+                        <a:latin typeface="Cambria Math" panose="02040503050406030204" pitchFamily="18" charset="0"/>
+                      </a:rPr>
+                      <m:t>𝑎</m:t>
+                    </m:r>
+                  </m:oMath>
+                </a14:m>
+                <a:r>
+                  <a:rPr lang="en-US" sz="3000" dirty="0"/>
+                  <a:t> and </a:t>
+                </a:r>
+                <a14:m>
+                  <m:oMath xmlns:m="http://schemas.openxmlformats.org/officeDocument/2006/math">
+                    <m:r>
+                      <a:rPr lang="en-US" sz="3000" i="1" dirty="0" smtClean="0">
+                        <a:latin typeface="Cambria Math" panose="02040503050406030204" pitchFamily="18" charset="0"/>
+                      </a:rPr>
+                      <m:t>𝑏</m:t>
+                    </m:r>
+                  </m:oMath>
+                </a14:m>
+                <a:r>
+                  <a:rPr lang="en-US" sz="3000" dirty="0"/>
+                  <a:t> be integers, not both zero. The greatest common divisor of </a:t>
+                </a:r>
+                <a14:m>
+                  <m:oMath xmlns:m="http://schemas.openxmlformats.org/officeDocument/2006/math">
+                    <m:r>
+                      <a:rPr lang="en-US" sz="3000" i="1" dirty="0" smtClean="0">
+                        <a:latin typeface="Cambria Math" panose="02040503050406030204" pitchFamily="18" charset="0"/>
+                      </a:rPr>
+                      <m:t>𝑎</m:t>
+                    </m:r>
+                  </m:oMath>
+                </a14:m>
+                <a:r>
+                  <a:rPr lang="en-US" sz="3000" dirty="0"/>
+                  <a:t> and </a:t>
+                </a:r>
+                <a14:m>
+                  <m:oMath xmlns:m="http://schemas.openxmlformats.org/officeDocument/2006/math">
+                    <m:r>
+                      <a:rPr lang="en-US" sz="3000" i="1" dirty="0" smtClean="0">
+                        <a:latin typeface="Cambria Math" panose="02040503050406030204" pitchFamily="18" charset="0"/>
+                      </a:rPr>
+                      <m:t>𝑏</m:t>
+                    </m:r>
+                  </m:oMath>
+                </a14:m>
+                <a:r>
+                  <a:rPr lang="en-US" sz="3000" dirty="0"/>
+                  <a:t>, denoted</a:t>
+                </a:r>
+              </a:p>
+              <a:p>
+                <a14:m>
+                  <m:oMath xmlns:m="http://schemas.openxmlformats.org/officeDocument/2006/math">
+                    <m:r>
+                      <m:rPr>
+                        <m:sty m:val="p"/>
+                      </m:rPr>
+                      <a:rPr lang="en-US" sz="3000" i="1" dirty="0" smtClean="0">
+                        <a:latin typeface="Cambria Math" panose="02040503050406030204" pitchFamily="18" charset="0"/>
+                      </a:rPr>
+                      <m:t>gcd</m:t>
+                    </m:r>
+                    <m:r>
+                      <a:rPr lang="en-US" sz="3000" i="1" dirty="0">
+                        <a:latin typeface="Cambria Math" panose="02040503050406030204" pitchFamily="18" charset="0"/>
+                      </a:rPr>
+                      <m:t>⁡(</m:t>
+                    </m:r>
+                    <m:r>
+                      <a:rPr lang="en-US" sz="3000" i="1" dirty="0" smtClean="0">
+                        <a:latin typeface="Cambria Math" panose="02040503050406030204" pitchFamily="18" charset="0"/>
+                      </a:rPr>
+                      <m:t>𝑎</m:t>
+                    </m:r>
+                    <m:r>
+                      <a:rPr lang="en-US" sz="3000" i="1" dirty="0" smtClean="0">
+                        <a:latin typeface="Cambria Math" panose="02040503050406030204" pitchFamily="18" charset="0"/>
+                      </a:rPr>
+                      <m:t>, </m:t>
+                    </m:r>
+                    <m:r>
+                      <a:rPr lang="en-US" sz="3000" i="1" dirty="0">
+                        <a:latin typeface="Cambria Math" panose="02040503050406030204" pitchFamily="18" charset="0"/>
+                      </a:rPr>
+                      <m:t>𝑏</m:t>
+                    </m:r>
+                    <m:r>
+                      <a:rPr lang="en-US" sz="3000" i="1" dirty="0">
+                        <a:latin typeface="Cambria Math" panose="02040503050406030204" pitchFamily="18" charset="0"/>
+                      </a:rPr>
+                      <m:t>), </m:t>
+                    </m:r>
+                  </m:oMath>
+                </a14:m>
+                <a:r>
+                  <a:rPr lang="en-US" sz="3000" dirty="0"/>
+                  <a:t>is the integer </a:t>
+                </a:r>
+                <a14:m>
+                  <m:oMath xmlns:m="http://schemas.openxmlformats.org/officeDocument/2006/math">
+                    <m:r>
+                      <a:rPr lang="en-US" sz="3000" i="1" dirty="0" smtClean="0">
+                        <a:latin typeface="Cambria Math" panose="02040503050406030204" pitchFamily="18" charset="0"/>
+                      </a:rPr>
+                      <m:t>𝑑</m:t>
+                    </m:r>
+                  </m:oMath>
+                </a14:m>
+                <a:r>
+                  <a:rPr lang="en-US" sz="3000" dirty="0"/>
+                  <a:t> satisfying:</a:t>
+                </a:r>
+              </a:p>
+              <a:p>
+                <a:r>
+                  <a:rPr lang="en-US" sz="3000" dirty="0"/>
+                  <a:t>1. </a:t>
+                </a:r>
+                <a14:m>
+                  <m:oMath xmlns:m="http://schemas.openxmlformats.org/officeDocument/2006/math">
+                    <m:r>
+                      <a:rPr lang="en-US" sz="3000" i="1" dirty="0" smtClean="0">
+                        <a:latin typeface="Cambria Math" panose="02040503050406030204" pitchFamily="18" charset="0"/>
+                      </a:rPr>
+                      <m:t>𝑑</m:t>
+                    </m:r>
+                    <m:r>
+                      <a:rPr lang="en-US" sz="3000" i="1" dirty="0" smtClean="0">
+                        <a:latin typeface="Cambria Math" panose="02040503050406030204" pitchFamily="18" charset="0"/>
+                      </a:rPr>
+                      <m:t> | </m:t>
+                    </m:r>
+                    <m:r>
+                      <a:rPr lang="en-US" sz="3000" i="1" dirty="0">
+                        <a:latin typeface="Cambria Math" panose="02040503050406030204" pitchFamily="18" charset="0"/>
+                      </a:rPr>
+                      <m:t>𝑎</m:t>
+                    </m:r>
+                    <m:r>
+                      <a:rPr lang="en-US" sz="3000" i="1" dirty="0">
+                        <a:latin typeface="Cambria Math" panose="02040503050406030204" pitchFamily="18" charset="0"/>
+                      </a:rPr>
+                      <m:t> </m:t>
+                    </m:r>
+                  </m:oMath>
+                </a14:m>
+                <a:r>
+                  <a:rPr lang="en-US" sz="3000" dirty="0"/>
+                  <a:t>and </a:t>
+                </a:r>
+                <a14:m>
+                  <m:oMath xmlns:m="http://schemas.openxmlformats.org/officeDocument/2006/math">
+                    <m:r>
+                      <a:rPr lang="en-US" sz="3000" i="1" dirty="0" smtClean="0">
+                        <a:latin typeface="Cambria Math" panose="02040503050406030204" pitchFamily="18" charset="0"/>
+                      </a:rPr>
+                      <m:t>𝑑</m:t>
+                    </m:r>
+                    <m:r>
+                      <a:rPr lang="en-US" sz="3000" i="1" dirty="0" smtClean="0">
+                        <a:latin typeface="Cambria Math" panose="02040503050406030204" pitchFamily="18" charset="0"/>
+                      </a:rPr>
+                      <m:t> | </m:t>
+                    </m:r>
+                    <m:r>
+                      <a:rPr lang="en-US" sz="3000" i="1" dirty="0">
+                        <a:latin typeface="Cambria Math" panose="02040503050406030204" pitchFamily="18" charset="0"/>
+                      </a:rPr>
+                      <m:t>𝑏</m:t>
+                    </m:r>
+                  </m:oMath>
+                </a14:m>
+                <a:endParaRPr lang="en-US" sz="3000" dirty="0"/>
+              </a:p>
+              <a:p>
+                <a:r>
+                  <a:rPr lang="en-US" sz="3000" dirty="0"/>
+                  <a:t>2. </a:t>
+                </a:r>
+                <a14:m>
+                  <m:oMath xmlns:m="http://schemas.openxmlformats.org/officeDocument/2006/math">
+                    <m:r>
+                      <a:rPr lang="en-MY" sz="3000" b="0" i="1" smtClean="0">
+                        <a:latin typeface="Cambria Math" panose="02040503050406030204" pitchFamily="18" charset="0"/>
+                      </a:rPr>
+                      <m:t>∀</m:t>
+                    </m:r>
+                    <m:r>
+                      <a:rPr lang="en-MY" sz="3000" b="0" i="1" smtClean="0">
+                        <a:latin typeface="Cambria Math" panose="02040503050406030204" pitchFamily="18" charset="0"/>
+                      </a:rPr>
+                      <m:t>𝑐</m:t>
+                    </m:r>
+                    <m:r>
+                      <a:rPr lang="en-MY" sz="3000" b="0" i="1" smtClean="0">
+                        <a:latin typeface="Cambria Math" panose="02040503050406030204" pitchFamily="18" charset="0"/>
+                      </a:rPr>
+                      <m:t>∈</m:t>
+                    </m:r>
+                    <m:r>
+                      <a:rPr lang="en-MY" sz="3000" b="0" i="1" smtClean="0">
+                        <a:latin typeface="Cambria Math" panose="02040503050406030204" pitchFamily="18" charset="0"/>
+                        <a:ea typeface="Cambria Math" panose="02040503050406030204" pitchFamily="18" charset="0"/>
+                      </a:rPr>
+                      <m:t>ℤ</m:t>
+                    </m:r>
+                  </m:oMath>
+                </a14:m>
+                <a:r>
+                  <a:rPr lang="en-US" sz="3000" dirty="0"/>
+                  <a:t>, if </a:t>
+                </a:r>
+                <a14:m>
+                  <m:oMath xmlns:m="http://schemas.openxmlformats.org/officeDocument/2006/math">
+                    <m:r>
+                      <a:rPr lang="en-US" sz="3000" i="1" dirty="0" smtClean="0">
+                        <a:latin typeface="Cambria Math" panose="02040503050406030204" pitchFamily="18" charset="0"/>
+                      </a:rPr>
+                      <m:t>𝑐</m:t>
+                    </m:r>
+                    <m:r>
+                      <a:rPr lang="en-US" sz="3000" i="1" dirty="0" smtClean="0">
+                        <a:latin typeface="Cambria Math" panose="02040503050406030204" pitchFamily="18" charset="0"/>
+                      </a:rPr>
+                      <m:t> | </m:t>
+                    </m:r>
+                    <m:r>
+                      <a:rPr lang="en-US" sz="3000" i="1" dirty="0">
+                        <a:latin typeface="Cambria Math" panose="02040503050406030204" pitchFamily="18" charset="0"/>
+                      </a:rPr>
+                      <m:t>𝑎</m:t>
+                    </m:r>
+                    <m:r>
+                      <a:rPr lang="en-US" sz="3000" i="1" dirty="0">
+                        <a:latin typeface="Cambria Math" panose="02040503050406030204" pitchFamily="18" charset="0"/>
+                      </a:rPr>
+                      <m:t> </m:t>
+                    </m:r>
+                  </m:oMath>
+                </a14:m>
+                <a:r>
+                  <a:rPr lang="en-US" sz="3000" dirty="0"/>
+                  <a:t>and </a:t>
+                </a:r>
+                <a14:m>
+                  <m:oMath xmlns:m="http://schemas.openxmlformats.org/officeDocument/2006/math">
+                    <m:r>
+                      <a:rPr lang="en-US" sz="3000" i="1" dirty="0" smtClean="0">
+                        <a:latin typeface="Cambria Math" panose="02040503050406030204" pitchFamily="18" charset="0"/>
+                      </a:rPr>
+                      <m:t>𝑐</m:t>
+                    </m:r>
+                    <m:r>
+                      <a:rPr lang="en-US" sz="3000" i="1" dirty="0" smtClean="0">
+                        <a:latin typeface="Cambria Math" panose="02040503050406030204" pitchFamily="18" charset="0"/>
+                      </a:rPr>
+                      <m:t> | </m:t>
+                    </m:r>
+                    <m:r>
+                      <a:rPr lang="en-US" sz="3000" i="1" dirty="0">
+                        <a:latin typeface="Cambria Math" panose="02040503050406030204" pitchFamily="18" charset="0"/>
+                      </a:rPr>
+                      <m:t>𝑏</m:t>
+                    </m:r>
+                    <m:r>
+                      <a:rPr lang="en-US" sz="3000" i="1" dirty="0">
+                        <a:latin typeface="Cambria Math" panose="02040503050406030204" pitchFamily="18" charset="0"/>
+                      </a:rPr>
+                      <m:t> </m:t>
+                    </m:r>
+                  </m:oMath>
+                </a14:m>
+                <a:r>
+                  <a:rPr lang="en-US" sz="3000" dirty="0"/>
+                  <a:t>then </a:t>
+                </a:r>
+                <a14:m>
+                  <m:oMath xmlns:m="http://schemas.openxmlformats.org/officeDocument/2006/math">
+                    <m:r>
+                      <a:rPr lang="en-US" sz="3000" i="1" dirty="0" smtClean="0">
+                        <a:latin typeface="Cambria Math" panose="02040503050406030204" pitchFamily="18" charset="0"/>
+                      </a:rPr>
+                      <m:t>𝑐</m:t>
+                    </m:r>
+                    <m:r>
+                      <a:rPr lang="en-MY" sz="3000" b="0" i="1" dirty="0" smtClean="0">
+                        <a:latin typeface="Cambria Math" panose="02040503050406030204" pitchFamily="18" charset="0"/>
+                      </a:rPr>
+                      <m:t>≤</m:t>
+                    </m:r>
+                    <m:r>
+                      <a:rPr lang="en-US" sz="3000" i="1" dirty="0" smtClean="0">
+                        <a:latin typeface="Cambria Math" panose="02040503050406030204" pitchFamily="18" charset="0"/>
+                      </a:rPr>
+                      <m:t>𝑑</m:t>
+                    </m:r>
+                  </m:oMath>
+                </a14:m>
+                <a:endParaRPr lang="en-MY" sz="3000" dirty="0"/>
+              </a:p>
+            </p:txBody>
+          </p:sp>
+        </mc:Choice>
+        <mc:Fallback>
+          <p:sp>
+            <p:nvSpPr>
+              <p:cNvPr id="3" name="Content Placeholder 2">
+                <a:extLst>
+                  <a:ext uri="{FF2B5EF4-FFF2-40B4-BE49-F238E27FC236}">
+                    <a16:creationId xmlns:a16="http://schemas.microsoft.com/office/drawing/2014/main" id="{821C69E7-6476-4A2D-AFEF-F2BD349B1F23}"/>
+                  </a:ext>
+                </a:extLst>
+              </p:cNvPr>
+              <p:cNvSpPr>
+                <a:spLocks noGrp="1" noRot="1" noChangeAspect="1" noMove="1" noResize="1" noEditPoints="1" noAdjustHandles="1" noChangeArrowheads="1" noChangeShapeType="1" noTextEdit="1"/>
+              </p:cNvSpPr>
+              <p:nvPr>
+                <p:ph idx="1"/>
+              </p:nvPr>
+            </p:nvSpPr>
+            <p:spPr>
+              <a:blipFill>
+                <a:blip r:embed="rId2"/>
+                <a:stretch>
+                  <a:fillRect l="-1394" t="-3030"/>
+                </a:stretch>
+              </a:blipFill>
+            </p:spPr>
+            <p:txBody>
+              <a:bodyPr/>
+              <a:lstStyle/>
+              <a:p>
+                <a:r>
+                  <a:rPr lang="en-MY">
+                    <a:noFill/>
+                  </a:rPr>
+                  <a:t> </a:t>
+                </a:r>
+              </a:p>
+            </p:txBody>
+          </p:sp>
+        </mc:Fallback>
+      </mc:AlternateContent>
     </p:spTree>
     <p:extLst>
       <p:ext uri="{BB962C8B-B14F-4D97-AF65-F5344CB8AC3E}">
-        <p14:creationId xmlns:p14="http://schemas.microsoft.com/office/powerpoint/2010/main" val="3263169878"/>
+        <p14:creationId xmlns:p14="http://schemas.microsoft.com/office/powerpoint/2010/main" val="2797658378"/>
       </p:ext>
     </p:extLst>
   </p:cSld>
@@ -4680,7 +5774,7 @@
           <p:cNvPr id="2" name="Title 1">
             <a:extLst>
               <a:ext uri="{FF2B5EF4-FFF2-40B4-BE49-F238E27FC236}">
-                <a16:creationId xmlns:a16="http://schemas.microsoft.com/office/drawing/2014/main" id="{8F7F666D-524D-4413-AF47-BA8F7448347A}"/>
+                <a16:creationId xmlns:a16="http://schemas.microsoft.com/office/drawing/2014/main" id="{B4BEE58F-C367-4572-9653-C3B619926859}"/>
               </a:ext>
             </a:extLst>
           </p:cNvPr>
@@ -4698,7 +5792,7 @@
           <a:p>
             <a:r>
               <a:rPr lang="en-MY" dirty="0"/>
-              <a:t>Number Theory</a:t>
+              <a:t>Euclid’s Algorithm</a:t>
             </a:r>
           </a:p>
         </p:txBody>
@@ -4708,7 +5802,7 @@
           <p:cNvPr id="3" name="Content Placeholder 2">
             <a:extLst>
               <a:ext uri="{FF2B5EF4-FFF2-40B4-BE49-F238E27FC236}">
-                <a16:creationId xmlns:a16="http://schemas.microsoft.com/office/drawing/2014/main" id="{158D8640-DBBA-4684-960C-749C0886E67F}"/>
+                <a16:creationId xmlns:a16="http://schemas.microsoft.com/office/drawing/2014/main" id="{821C69E7-6476-4A2D-AFEF-F2BD349B1F23}"/>
               </a:ext>
             </a:extLst>
           </p:cNvPr>
@@ -4726,40 +5820,94 @@
           </a:bodyPr>
           <a:lstStyle/>
           <a:p>
-            <a:r>
-              <a:rPr lang="en-MY" sz="3200" dirty="0"/>
-              <a:t>Primes are fun!</a:t>
-            </a:r>
-          </a:p>
-          <a:p>
-            <a:endParaRPr lang="en-MY" sz="3200" dirty="0"/>
-          </a:p>
-          <a:p>
-            <a:r>
-              <a:rPr lang="en-MY" sz="3200" dirty="0"/>
-              <a:t>Fundamental Theorem of Arithmetic:</a:t>
-            </a:r>
-          </a:p>
-          <a:p>
-            <a:r>
-              <a:rPr lang="en-MY" sz="3200" dirty="0"/>
-              <a:t>All positive integers greater than 1 can be </a:t>
-            </a:r>
-            <a:r>
-              <a:rPr lang="en-MY" sz="3200" i="1" dirty="0"/>
-              <a:t>uniquely</a:t>
-            </a:r>
-            <a:r>
-              <a:rPr lang="en-MY" sz="3200" dirty="0"/>
-              <a:t> factorized into a product of prime numbers</a:t>
-            </a:r>
+            <a:pPr marL="0" indent="0">
+              <a:buNone/>
+            </a:pPr>
+            <a:r>
+              <a:rPr lang="en-US" sz="3000" dirty="0"/>
+              <a:t>function </a:t>
+            </a:r>
+            <a:r>
+              <a:rPr lang="en-US" sz="3000" dirty="0" err="1"/>
+              <a:t>gcd</a:t>
+            </a:r>
+            <a:r>
+              <a:rPr lang="en-US" sz="3000" dirty="0"/>
+              <a:t>(</a:t>
+            </a:r>
+            <a:r>
+              <a:rPr lang="en-US" sz="3000" dirty="0" err="1"/>
+              <a:t>a,b</a:t>
+            </a:r>
+            <a:r>
+              <a:rPr lang="en-US" sz="3000" dirty="0"/>
+              <a:t>):</a:t>
+            </a:r>
+          </a:p>
+          <a:p>
+            <a:pPr marL="0" indent="0">
+              <a:buNone/>
+            </a:pPr>
+            <a:r>
+              <a:rPr lang="en-US" sz="3000" dirty="0"/>
+              <a:t>	while b&gt;0:</a:t>
+            </a:r>
+          </a:p>
+          <a:p>
+            <a:pPr marL="0" indent="0">
+              <a:buNone/>
+            </a:pPr>
+            <a:r>
+              <a:rPr lang="en-US" sz="3000" dirty="0"/>
+              <a:t>		c = </a:t>
+            </a:r>
+            <a:r>
+              <a:rPr lang="en-US" sz="3000" dirty="0" err="1"/>
+              <a:t>a%b</a:t>
+            </a:r>
+            <a:endParaRPr lang="en-US" sz="3000" dirty="0"/>
+          </a:p>
+          <a:p>
+            <a:pPr marL="0" indent="0">
+              <a:buNone/>
+            </a:pPr>
+            <a:r>
+              <a:rPr lang="en-US" sz="3000" dirty="0"/>
+              <a:t>		(</a:t>
+            </a:r>
+            <a:r>
+              <a:rPr lang="en-US" sz="3000" dirty="0" err="1"/>
+              <a:t>a,b</a:t>
+            </a:r>
+            <a:r>
+              <a:rPr lang="en-US" sz="3000" dirty="0"/>
+              <a:t>) = (</a:t>
+            </a:r>
+            <a:r>
+              <a:rPr lang="en-US" sz="3000" dirty="0" err="1"/>
+              <a:t>b,c</a:t>
+            </a:r>
+            <a:r>
+              <a:rPr lang="en-US" sz="3000" dirty="0"/>
+              <a:t>)</a:t>
+            </a:r>
+          </a:p>
+          <a:p>
+            <a:pPr marL="0" indent="0">
+              <a:buNone/>
+            </a:pPr>
+            <a:r>
+              <a:rPr lang="en-US" sz="3000" dirty="0"/>
+              <a:t>	return a</a:t>
+            </a:r>
+            <a:endParaRPr lang="en-MY" sz="3000" dirty="0"/>
           </a:p>
         </p:txBody>
       </p:sp>
     </p:spTree>
     <p:extLst>
       <p:ext uri="{BB962C8B-B14F-4D97-AF65-F5344CB8AC3E}">
-        <p14:creationId xmlns:p14="http://schemas.microsoft.com/office/powerpoint/2010/main" val="3054315706"/>
+        <p14:creationId xmlns:p14="http://schemas.microsoft.com/office/powerpoint/2010/main" val="777260874"/>
       </p:ext>
     </p:extLst>
   </p:cSld>
@@ -4791,7 +5939,7 @@
           <p:cNvPr id="2" name="Title 1">
             <a:extLst>
               <a:ext uri="{FF2B5EF4-FFF2-40B4-BE49-F238E27FC236}">
-                <a16:creationId xmlns:a16="http://schemas.microsoft.com/office/drawing/2014/main" id="{ED63380C-C7CE-4124-B11F-D815085C5301}"/>
+                <a16:creationId xmlns:a16="http://schemas.microsoft.com/office/drawing/2014/main" id="{0BF8A6EA-C888-49ED-91A0-8DB4D9E5D06A}"/>
               </a:ext>
             </a:extLst>
           </p:cNvPr>
@@ -4809,19 +5957,19 @@
           <a:p>
             <a:r>
               <a:rPr lang="en-MY" dirty="0"/>
-              <a:t>Number Theory</a:t>
-            </a:r>
-          </a:p>
-        </p:txBody>
-      </p:sp>
-      <mc:AlternateContent xmlns:mc="http://schemas.openxmlformats.org/markup-compatibility/2006" xmlns:a14="http://schemas.microsoft.com/office/drawing/2010/main">
-        <mc:Choice Requires="a14">
+              <a:t>Extended Euclidean Algorithm</a:t>
+            </a:r>
+          </a:p>
+        </p:txBody>
+      </p:sp>
+      <mc:AlternateContent xmlns:mc="http://schemas.openxmlformats.org/markup-compatibility/2006">
+        <mc:Choice xmlns:a14="http://schemas.microsoft.com/office/drawing/2010/main" Requires="a14">
           <p:sp>
             <p:nvSpPr>
               <p:cNvPr id="3" name="Content Placeholder 2">
                 <a:extLst>
                   <a:ext uri="{FF2B5EF4-FFF2-40B4-BE49-F238E27FC236}">
-                    <a16:creationId xmlns:a16="http://schemas.microsoft.com/office/drawing/2014/main" id="{194789D0-21A6-4273-9E30-CAA1CCE18BF2}"/>
+                    <a16:creationId xmlns:a16="http://schemas.microsoft.com/office/drawing/2014/main" id="{18468980-FB3A-4E54-9AA9-46B542342893}"/>
                   </a:ext>
                 </a:extLst>
               </p:cNvPr>
@@ -4840,96 +5988,116 @@
               <a:lstStyle/>
               <a:p>
                 <a:r>
-                  <a:rPr lang="en-MY" sz="3200" dirty="0"/>
-                  <a:t>Show that </a:t>
+                  <a:rPr lang="en-MY" sz="3000" dirty="0"/>
+                  <a:t>1. Perform Euclid’s algorithm on </a:t>
                 </a:r>
                 <a14:m>
                   <m:oMath xmlns:m="http://schemas.openxmlformats.org/officeDocument/2006/math">
-                    <m:sSup>
-                      <m:sSupPr>
-                        <m:ctrlPr>
-                          <a:rPr lang="en-MY" sz="4400" b="0" i="1" smtClean="0">
-                            <a:latin typeface="Cambria Math" panose="02040503050406030204" pitchFamily="18" charset="0"/>
-                          </a:rPr>
-                        </m:ctrlPr>
-                      </m:sSupPr>
-                      <m:e>
-                        <m:r>
-                          <a:rPr lang="en-MY" sz="4400" b="0" i="1" smtClean="0">
-                            <a:latin typeface="Cambria Math" panose="02040503050406030204" pitchFamily="18" charset="0"/>
-                          </a:rPr>
-                          <m:t>2</m:t>
-                        </m:r>
-                      </m:e>
-                      <m:sup>
-                        <m:f>
-                          <m:fPr>
-                            <m:ctrlPr>
-                              <a:rPr lang="en-MY" sz="4400" b="0" i="1" smtClean="0">
-                                <a:latin typeface="Cambria Math" panose="02040503050406030204" pitchFamily="18" charset="0"/>
-                              </a:rPr>
-                            </m:ctrlPr>
-                          </m:fPr>
-                          <m:num>
-                            <m:r>
-                              <a:rPr lang="en-MY" sz="4400" b="0" i="1" smtClean="0">
-                                <a:latin typeface="Cambria Math" panose="02040503050406030204" pitchFamily="18" charset="0"/>
-                              </a:rPr>
-                              <m:t>1</m:t>
-                            </m:r>
-                          </m:num>
-                          <m:den>
-                            <m:r>
-                              <a:rPr lang="en-MY" sz="4400" b="0" i="1" smtClean="0">
-                                <a:latin typeface="Cambria Math" panose="02040503050406030204" pitchFamily="18" charset="0"/>
-                              </a:rPr>
-                              <m:t>𝑛</m:t>
-                            </m:r>
-                          </m:den>
-                        </m:f>
-                      </m:sup>
-                    </m:sSup>
+                    <m:r>
+                      <a:rPr lang="en-MY" sz="3000" i="1" dirty="0" smtClean="0">
+                        <a:latin typeface="Cambria Math" panose="02040503050406030204" pitchFamily="18" charset="0"/>
+                      </a:rPr>
+                      <m:t>𝑎</m:t>
+                    </m:r>
+                    <m:r>
+                      <a:rPr lang="en-MY" sz="3000" i="1" dirty="0" smtClean="0">
+                        <a:latin typeface="Cambria Math" panose="02040503050406030204" pitchFamily="18" charset="0"/>
+                      </a:rPr>
+                      <m:t>, </m:t>
+                    </m:r>
+                    <m:r>
+                      <a:rPr lang="en-MY" sz="3000" i="1" dirty="0" smtClean="0">
+                        <a:latin typeface="Cambria Math" panose="02040503050406030204" pitchFamily="18" charset="0"/>
+                      </a:rPr>
+                      <m:t>𝑏</m:t>
+                    </m:r>
+                    <m:r>
+                      <a:rPr lang="en-MY" sz="3000" i="1" dirty="0" smtClean="0">
+                        <a:latin typeface="Cambria Math" panose="02040503050406030204" pitchFamily="18" charset="0"/>
+                      </a:rPr>
+                      <m:t> </m:t>
+                    </m:r>
                   </m:oMath>
                 </a14:m>
                 <a:r>
-                  <a:rPr lang="en-MY" sz="4400" dirty="0"/>
+                  <a:rPr lang="en-MY" sz="3000" dirty="0"/>
+                  <a:t>to obtain the </a:t>
+                </a:r>
+                <a:r>
+                  <a:rPr lang="en-MY" sz="3000" dirty="0" err="1"/>
+                  <a:t>gcd</a:t>
+                </a:r>
+                <a:r>
+                  <a:rPr lang="en-MY" sz="3000" dirty="0"/>
                   <a:t> </a:t>
-                </a:r>
-                <a:r>
-                  <a:rPr lang="en-MY" sz="3200" dirty="0"/>
-                  <a:t>is irrational for any </a:t>
                 </a:r>
                 <a14:m>
                   <m:oMath xmlns:m="http://schemas.openxmlformats.org/officeDocument/2006/math">
                     <m:r>
-                      <a:rPr lang="en-MY" sz="3200" b="0" i="1" smtClean="0">
-                        <a:latin typeface="Cambria Math" panose="02040503050406030204" pitchFamily="18" charset="0"/>
-                      </a:rPr>
-                      <m:t>𝑛</m:t>
-                    </m:r>
-                    <m:r>
-                      <a:rPr lang="en-MY" sz="3200" b="0" i="1" smtClean="0">
-                        <a:latin typeface="Cambria Math" panose="02040503050406030204" pitchFamily="18" charset="0"/>
-                      </a:rPr>
-                      <m:t>≥2</m:t>
+                      <a:rPr lang="en-MY" sz="3000" i="1" dirty="0" smtClean="0">
+                        <a:latin typeface="Cambria Math" panose="02040503050406030204" pitchFamily="18" charset="0"/>
+                      </a:rPr>
+                      <m:t>𝑑</m:t>
                     </m:r>
                   </m:oMath>
                 </a14:m>
-                <a:endParaRPr lang="en-MY" sz="3200" b="0" dirty="0"/>
+                <a:endParaRPr lang="en-MY" sz="3000" dirty="0"/>
               </a:p>
               <a:p>
-                <a:endParaRPr lang="en-MY" sz="3200" dirty="0"/>
+                <a:r>
+                  <a:rPr lang="en-MY" sz="3000" dirty="0"/>
+                  <a:t>2. Work backwards to express </a:t>
+                </a:r>
+                <a14:m>
+                  <m:oMath xmlns:m="http://schemas.openxmlformats.org/officeDocument/2006/math">
+                    <m:r>
+                      <a:rPr lang="en-MY" sz="3000" i="1" dirty="0" smtClean="0">
+                        <a:latin typeface="Cambria Math" panose="02040503050406030204" pitchFamily="18" charset="0"/>
+                      </a:rPr>
+                      <m:t>𝑑</m:t>
+                    </m:r>
+                  </m:oMath>
+                </a14:m>
+                <a:r>
+                  <a:rPr lang="en-MY" sz="3000" dirty="0"/>
+                  <a:t> in terms of the linear combinations of the quotients and remainders of the previous lines until we reach </a:t>
+                </a:r>
+                <a14:m>
+                  <m:oMath xmlns:m="http://schemas.openxmlformats.org/officeDocument/2006/math">
+                    <m:r>
+                      <a:rPr lang="en-MY" sz="3000" i="1" dirty="0" smtClean="0">
+                        <a:latin typeface="Cambria Math" panose="02040503050406030204" pitchFamily="18" charset="0"/>
+                      </a:rPr>
+                      <m:t>𝑎</m:t>
+                    </m:r>
+                  </m:oMath>
+                </a14:m>
+                <a:r>
+                  <a:rPr lang="en-MY" sz="3000" dirty="0"/>
+                  <a:t> and </a:t>
+                </a:r>
+                <a14:m>
+                  <m:oMath xmlns:m="http://schemas.openxmlformats.org/officeDocument/2006/math">
+                    <m:r>
+                      <a:rPr lang="en-MY" sz="3000" i="1" dirty="0" smtClean="0">
+                        <a:latin typeface="Cambria Math" panose="02040503050406030204" pitchFamily="18" charset="0"/>
+                      </a:rPr>
+                      <m:t>𝑏</m:t>
+                    </m:r>
+                  </m:oMath>
+                </a14:m>
+                <a:endParaRPr lang="en-MY" sz="3000" dirty="0"/>
               </a:p>
             </p:txBody>
           </p:sp>
         </mc:Choice>
-        <mc:Fallback xmlns="">
+        <mc:Fallback>
           <p:sp>
             <p:nvSpPr>
               <p:cNvPr id="3" name="Content Placeholder 2">
                 <a:extLst>
                   <a:ext uri="{FF2B5EF4-FFF2-40B4-BE49-F238E27FC236}">
-                    <a16:creationId xmlns:a16="http://schemas.microsoft.com/office/drawing/2014/main" id="{194789D0-21A6-4273-9E30-CAA1CCE18BF2}"/>
+                    <a16:creationId xmlns:a16="http://schemas.microsoft.com/office/drawing/2014/main" id="{18468980-FB3A-4E54-9AA9-46B542342893}"/>
                   </a:ext>
                 </a:extLst>
               </p:cNvPr>
@@ -4944,7 +6112,7 @@
               <a:blipFill>
                 <a:blip r:embed="rId2"/>
                 <a:stretch>
-                  <a:fillRect l="-1515"/>
+                  <a:fillRect l="-1394" t="-3030"/>
                 </a:stretch>
               </a:blipFill>
             </p:spPr>
@@ -4966,7 +6134,7 @@
     </p:spTree>
     <p:extLst>
       <p:ext uri="{BB962C8B-B14F-4D97-AF65-F5344CB8AC3E}">
-        <p14:creationId xmlns:p14="http://schemas.microsoft.com/office/powerpoint/2010/main" val="7463580"/>
+        <p14:creationId xmlns:p14="http://schemas.microsoft.com/office/powerpoint/2010/main" val="177615905"/>
       </p:ext>
     </p:extLst>
   </p:cSld>
@@ -4998,7 +6166,7 @@
           <p:cNvPr id="2" name="Title 1">
             <a:extLst>
               <a:ext uri="{FF2B5EF4-FFF2-40B4-BE49-F238E27FC236}">
-                <a16:creationId xmlns:a16="http://schemas.microsoft.com/office/drawing/2014/main" id="{57B1B858-8642-4784-ADCF-0B3E36515793}"/>
+                <a16:creationId xmlns:a16="http://schemas.microsoft.com/office/drawing/2014/main" id="{0BF8A6EA-C888-49ED-91A0-8DB4D9E5D06A}"/>
               </a:ext>
             </a:extLst>
           </p:cNvPr>
@@ -5016,19 +6184,774 @@
           <a:p>
             <a:r>
               <a:rPr lang="en-MY" dirty="0"/>
-              <a:t>Fermat’s Last Theorem</a:t>
-            </a:r>
-          </a:p>
-        </p:txBody>
-      </p:sp>
-      <mc:AlternateContent xmlns:mc="http://schemas.openxmlformats.org/markup-compatibility/2006" xmlns:a14="http://schemas.microsoft.com/office/drawing/2010/main">
-        <mc:Choice Requires="a14">
+              <a:t>Extended Euclidean Algorithm</a:t>
+            </a:r>
+          </a:p>
+        </p:txBody>
+      </p:sp>
+      <mc:AlternateContent xmlns:mc="http://schemas.openxmlformats.org/markup-compatibility/2006">
+        <mc:Choice xmlns:a14="http://schemas.microsoft.com/office/drawing/2010/main" Requires="a14">
           <p:sp>
             <p:nvSpPr>
               <p:cNvPr id="3" name="Content Placeholder 2">
                 <a:extLst>
                   <a:ext uri="{FF2B5EF4-FFF2-40B4-BE49-F238E27FC236}">
-                    <a16:creationId xmlns:a16="http://schemas.microsoft.com/office/drawing/2014/main" id="{0B23BD6D-0666-47AA-AFFE-C027E4D74B59}"/>
+                    <a16:creationId xmlns:a16="http://schemas.microsoft.com/office/drawing/2014/main" id="{18468980-FB3A-4E54-9AA9-46B542342893}"/>
+                  </a:ext>
+                </a:extLst>
+              </p:cNvPr>
+              <p:cNvSpPr>
+                <a:spLocks noGrp="1"/>
+              </p:cNvSpPr>
+              <p:nvPr>
+                <p:ph idx="1"/>
+              </p:nvPr>
+            </p:nvSpPr>
+            <p:spPr>
+              <a:xfrm>
+                <a:off x="1097279" y="1845733"/>
+                <a:ext cx="10414535" cy="4535815"/>
+              </a:xfrm>
+            </p:spPr>
+            <p:txBody>
+              <a:bodyPr>
+                <a:noAutofit/>
+              </a:bodyPr>
+              <a:lstStyle/>
+              <a:p>
+                <a:r>
+                  <a:rPr lang="en-MY" sz="2400" dirty="0"/>
+                  <a:t>gcd(330, 156)</a:t>
+                </a:r>
+              </a:p>
+              <a:p>
+                <a:r>
+                  <a:rPr lang="nn-NO" sz="2400" dirty="0"/>
+                  <a:t>(i) </a:t>
+                </a:r>
+                <a14:m>
+                  <m:oMath xmlns:m="http://schemas.openxmlformats.org/officeDocument/2006/math">
+                    <m:r>
+                      <a:rPr lang="nn-NO" sz="2400" i="1" dirty="0" smtClean="0">
+                        <a:latin typeface="Cambria Math" panose="02040503050406030204" pitchFamily="18" charset="0"/>
+                      </a:rPr>
+                      <m:t>330 = 156</m:t>
+                    </m:r>
+                    <m:r>
+                      <a:rPr lang="en-MY" sz="2400" b="0" i="1" dirty="0" smtClean="0">
+                        <a:latin typeface="Cambria Math" panose="02040503050406030204" pitchFamily="18" charset="0"/>
+                      </a:rPr>
+                      <m:t>×</m:t>
+                    </m:r>
+                    <m:r>
+                      <a:rPr lang="nn-NO" sz="2400" i="1" dirty="0" smtClean="0">
+                        <a:latin typeface="Cambria Math" panose="02040503050406030204" pitchFamily="18" charset="0"/>
+                      </a:rPr>
+                      <m:t> </m:t>
+                    </m:r>
+                    <m:r>
+                      <a:rPr lang="nn-NO" sz="2400" i="1" dirty="0">
+                        <a:latin typeface="Cambria Math" panose="02040503050406030204" pitchFamily="18" charset="0"/>
+                      </a:rPr>
+                      <m:t>2 + 18   </m:t>
+                    </m:r>
+                    <m:r>
+                      <m:rPr>
+                        <m:sty m:val="p"/>
+                      </m:rPr>
+                      <a:rPr lang="nn-NO" sz="2400" i="1" dirty="0">
+                        <a:latin typeface="Cambria Math" panose="02040503050406030204" pitchFamily="18" charset="0"/>
+                      </a:rPr>
+                      <m:t>gcd</m:t>
+                    </m:r>
+                    <m:r>
+                      <a:rPr lang="nn-NO" sz="2400" i="1" dirty="0">
+                        <a:latin typeface="Cambria Math" panose="02040503050406030204" pitchFamily="18" charset="0"/>
+                      </a:rPr>
+                      <m:t>⁡(156, 18)</m:t>
+                    </m:r>
+                  </m:oMath>
+                </a14:m>
+                <a:endParaRPr lang="nn-NO" sz="2400" dirty="0"/>
+              </a:p>
+              <a:p>
+                <a:r>
+                  <a:rPr lang="en-MY" sz="2400" dirty="0"/>
+                  <a:t>(ii) </a:t>
+                </a:r>
+                <a14:m>
+                  <m:oMath xmlns:m="http://schemas.openxmlformats.org/officeDocument/2006/math">
+                    <m:r>
+                      <a:rPr lang="en-MY" sz="2400" i="1" dirty="0" smtClean="0">
+                        <a:latin typeface="Cambria Math" panose="02040503050406030204" pitchFamily="18" charset="0"/>
+                      </a:rPr>
+                      <m:t>156 = 18</m:t>
+                    </m:r>
+                    <m:r>
+                      <a:rPr lang="en-MY" sz="2400" b="0" i="1" dirty="0" smtClean="0">
+                        <a:latin typeface="Cambria Math" panose="02040503050406030204" pitchFamily="18" charset="0"/>
+                      </a:rPr>
+                      <m:t>×</m:t>
+                    </m:r>
+                    <m:r>
+                      <a:rPr lang="en-MY" sz="2400" i="1" dirty="0" smtClean="0">
+                        <a:latin typeface="Cambria Math" panose="02040503050406030204" pitchFamily="18" charset="0"/>
+                      </a:rPr>
+                      <m:t> </m:t>
+                    </m:r>
+                    <m:r>
+                      <a:rPr lang="en-MY" sz="2400" i="1" dirty="0">
+                        <a:latin typeface="Cambria Math" panose="02040503050406030204" pitchFamily="18" charset="0"/>
+                      </a:rPr>
+                      <m:t>8 + 12   </m:t>
+                    </m:r>
+                    <m:r>
+                      <m:rPr>
+                        <m:sty m:val="p"/>
+                      </m:rPr>
+                      <a:rPr lang="en-MY" sz="2400" i="1" dirty="0" err="1">
+                        <a:latin typeface="Cambria Math" panose="02040503050406030204" pitchFamily="18" charset="0"/>
+                      </a:rPr>
+                      <m:t>gcd</m:t>
+                    </m:r>
+                    <m:r>
+                      <a:rPr lang="en-MY" sz="2400" i="1" dirty="0">
+                        <a:latin typeface="Cambria Math" panose="02040503050406030204" pitchFamily="18" charset="0"/>
+                      </a:rPr>
+                      <m:t>⁡(</m:t>
+                    </m:r>
+                    <m:r>
+                      <a:rPr lang="en-MY" sz="2400" i="1" dirty="0" smtClean="0">
+                        <a:latin typeface="Cambria Math" panose="02040503050406030204" pitchFamily="18" charset="0"/>
+                      </a:rPr>
+                      <m:t>18, </m:t>
+                    </m:r>
+                    <m:r>
+                      <a:rPr lang="en-MY" sz="2400" i="1" dirty="0">
+                        <a:latin typeface="Cambria Math" panose="02040503050406030204" pitchFamily="18" charset="0"/>
+                      </a:rPr>
+                      <m:t>12)</m:t>
+                    </m:r>
+                  </m:oMath>
+                </a14:m>
+                <a:endParaRPr lang="en-MY" sz="2400" dirty="0"/>
+              </a:p>
+              <a:p>
+                <a:r>
+                  <a:rPr lang="en-MY" sz="2400" dirty="0"/>
+                  <a:t>(iii) </a:t>
+                </a:r>
+                <a14:m>
+                  <m:oMath xmlns:m="http://schemas.openxmlformats.org/officeDocument/2006/math">
+                    <m:r>
+                      <a:rPr lang="en-MY" sz="2400" i="1" dirty="0" smtClean="0">
+                        <a:latin typeface="Cambria Math" panose="02040503050406030204" pitchFamily="18" charset="0"/>
+                      </a:rPr>
+                      <m:t>18 = 12</m:t>
+                    </m:r>
+                    <m:r>
+                      <a:rPr lang="en-MY" sz="2400" b="0" i="1" dirty="0" smtClean="0">
+                        <a:latin typeface="Cambria Math" panose="02040503050406030204" pitchFamily="18" charset="0"/>
+                      </a:rPr>
+                      <m:t>×</m:t>
+                    </m:r>
+                    <m:r>
+                      <a:rPr lang="en-MY" sz="2400" i="1" dirty="0" smtClean="0">
+                        <a:latin typeface="Cambria Math" panose="02040503050406030204" pitchFamily="18" charset="0"/>
+                      </a:rPr>
+                      <m:t> </m:t>
+                    </m:r>
+                    <m:r>
+                      <a:rPr lang="en-MY" sz="2400" i="1" dirty="0">
+                        <a:latin typeface="Cambria Math" panose="02040503050406030204" pitchFamily="18" charset="0"/>
+                      </a:rPr>
+                      <m:t>1 + 6   </m:t>
+                    </m:r>
+                    <m:r>
+                      <m:rPr>
+                        <m:sty m:val="p"/>
+                      </m:rPr>
+                      <a:rPr lang="en-MY" sz="2400" i="1" dirty="0" err="1">
+                        <a:latin typeface="Cambria Math" panose="02040503050406030204" pitchFamily="18" charset="0"/>
+                      </a:rPr>
+                      <m:t>gcd</m:t>
+                    </m:r>
+                    <m:r>
+                      <a:rPr lang="en-MY" sz="2400" i="1" dirty="0">
+                        <a:latin typeface="Cambria Math" panose="02040503050406030204" pitchFamily="18" charset="0"/>
+                      </a:rPr>
+                      <m:t>⁡(</m:t>
+                    </m:r>
+                    <m:r>
+                      <a:rPr lang="en-MY" sz="2400" i="1" dirty="0" smtClean="0">
+                        <a:latin typeface="Cambria Math" panose="02040503050406030204" pitchFamily="18" charset="0"/>
+                      </a:rPr>
+                      <m:t>12, </m:t>
+                    </m:r>
+                    <m:r>
+                      <a:rPr lang="en-MY" sz="2400" i="1" dirty="0">
+                        <a:latin typeface="Cambria Math" panose="02040503050406030204" pitchFamily="18" charset="0"/>
+                      </a:rPr>
+                      <m:t>6)</m:t>
+                    </m:r>
+                  </m:oMath>
+                </a14:m>
+                <a:endParaRPr lang="en-MY" sz="2400" dirty="0"/>
+              </a:p>
+              <a:p>
+                <a:r>
+                  <a:rPr lang="en-MY" sz="2400" dirty="0"/>
+                  <a:t>(iv) </a:t>
+                </a:r>
+                <a14:m>
+                  <m:oMath xmlns:m="http://schemas.openxmlformats.org/officeDocument/2006/math">
+                    <m:r>
+                      <a:rPr lang="en-MY" sz="2400" i="1" dirty="0" smtClean="0">
+                        <a:latin typeface="Cambria Math" panose="02040503050406030204" pitchFamily="18" charset="0"/>
+                      </a:rPr>
+                      <m:t>12 = 6</m:t>
+                    </m:r>
+                    <m:r>
+                      <a:rPr lang="en-MY" sz="2400" b="0" i="1" dirty="0" smtClean="0">
+                        <a:latin typeface="Cambria Math" panose="02040503050406030204" pitchFamily="18" charset="0"/>
+                      </a:rPr>
+                      <m:t>×</m:t>
+                    </m:r>
+                    <m:r>
+                      <a:rPr lang="en-MY" sz="2400" i="1" dirty="0" smtClean="0">
+                        <a:latin typeface="Cambria Math" panose="02040503050406030204" pitchFamily="18" charset="0"/>
+                      </a:rPr>
+                      <m:t> </m:t>
+                    </m:r>
+                    <m:r>
+                      <a:rPr lang="en-MY" sz="2400" i="1" dirty="0">
+                        <a:latin typeface="Cambria Math" panose="02040503050406030204" pitchFamily="18" charset="0"/>
+                      </a:rPr>
+                      <m:t>2 + 0   </m:t>
+                    </m:r>
+                    <m:r>
+                      <m:rPr>
+                        <m:sty m:val="p"/>
+                      </m:rPr>
+                      <a:rPr lang="en-MY" sz="2400" i="1" dirty="0" err="1">
+                        <a:latin typeface="Cambria Math" panose="02040503050406030204" pitchFamily="18" charset="0"/>
+                      </a:rPr>
+                      <m:t>gcd</m:t>
+                    </m:r>
+                    <m:r>
+                      <a:rPr lang="en-MY" sz="2400" i="1" dirty="0">
+                        <a:latin typeface="Cambria Math" panose="02040503050406030204" pitchFamily="18" charset="0"/>
+                      </a:rPr>
+                      <m:t>⁡(</m:t>
+                    </m:r>
+                    <m:r>
+                      <a:rPr lang="en-MY" sz="2400" i="1" dirty="0" smtClean="0">
+                        <a:latin typeface="Cambria Math" panose="02040503050406030204" pitchFamily="18" charset="0"/>
+                      </a:rPr>
+                      <m:t>6, </m:t>
+                    </m:r>
+                    <m:r>
+                      <a:rPr lang="en-MY" sz="2400" i="1" dirty="0">
+                        <a:latin typeface="Cambria Math" panose="02040503050406030204" pitchFamily="18" charset="0"/>
+                      </a:rPr>
+                      <m:t>0</m:t>
+                    </m:r>
+                    <m:r>
+                      <a:rPr lang="en-MY" sz="2400" i="1" dirty="0" smtClean="0">
+                        <a:latin typeface="Cambria Math" panose="02040503050406030204" pitchFamily="18" charset="0"/>
+                      </a:rPr>
+                      <m:t>)</m:t>
+                    </m:r>
+                  </m:oMath>
+                </a14:m>
+                <a:endParaRPr lang="en-MY" sz="2400" dirty="0"/>
+              </a:p>
+              <a:p>
+                <a:endParaRPr lang="en-MY" sz="2400" dirty="0"/>
+              </a:p>
+              <a:p>
+                <a14:m>
+                  <m:oMath xmlns:m="http://schemas.openxmlformats.org/officeDocument/2006/math">
+                    <m:r>
+                      <a:rPr lang="en-US" sz="2400" i="1" dirty="0" smtClean="0">
+                        <a:latin typeface="Cambria Math" panose="02040503050406030204" pitchFamily="18" charset="0"/>
+                      </a:rPr>
+                      <m:t>6 = 18 − </m:t>
+                    </m:r>
+                    <m:r>
+                      <a:rPr lang="en-US" sz="2400" i="1" dirty="0">
+                        <a:latin typeface="Cambria Math" panose="02040503050406030204" pitchFamily="18" charset="0"/>
+                      </a:rPr>
+                      <m:t>12</m:t>
+                    </m:r>
+                    <m:r>
+                      <a:rPr lang="en-MY" sz="2400" b="0" i="1" dirty="0" smtClean="0">
+                        <a:latin typeface="Cambria Math" panose="02040503050406030204" pitchFamily="18" charset="0"/>
+                      </a:rPr>
+                      <m:t>×</m:t>
+                    </m:r>
+                    <m:r>
+                      <a:rPr lang="en-US" sz="2400" i="1" dirty="0" smtClean="0">
+                        <a:latin typeface="Cambria Math" panose="02040503050406030204" pitchFamily="18" charset="0"/>
+                      </a:rPr>
+                      <m:t> </m:t>
+                    </m:r>
+                    <m:r>
+                      <a:rPr lang="en-US" sz="2400" i="1" dirty="0">
+                        <a:latin typeface="Cambria Math" panose="02040503050406030204" pitchFamily="18" charset="0"/>
+                      </a:rPr>
+                      <m:t>1 = 18 + 12</m:t>
+                    </m:r>
+                    <m:r>
+                      <a:rPr lang="en-MY" sz="2400" b="0" i="1" dirty="0" smtClean="0">
+                        <a:latin typeface="Cambria Math" panose="02040503050406030204" pitchFamily="18" charset="0"/>
+                      </a:rPr>
+                      <m:t>×</m:t>
+                    </m:r>
+                    <m:r>
+                      <a:rPr lang="en-US" sz="2400" i="1" dirty="0" smtClean="0">
+                        <a:latin typeface="Cambria Math" panose="02040503050406030204" pitchFamily="18" charset="0"/>
+                      </a:rPr>
+                      <m:t> (−1</m:t>
+                    </m:r>
+                    <m:r>
+                      <a:rPr lang="en-US" sz="2400" i="1" dirty="0">
+                        <a:latin typeface="Cambria Math" panose="02040503050406030204" pitchFamily="18" charset="0"/>
+                      </a:rPr>
+                      <m:t>) </m:t>
+                    </m:r>
+                  </m:oMath>
+                </a14:m>
+                <a:r>
+                  <a:rPr lang="en-US" sz="2400" dirty="0"/>
+                  <a:t>Using (iii)</a:t>
+                </a:r>
+              </a:p>
+              <a:p>
+                <a14:m>
+                  <m:oMath xmlns:m="http://schemas.openxmlformats.org/officeDocument/2006/math">
+                    <m:r>
+                      <a:rPr lang="en-US" sz="2400" i="1" dirty="0" smtClean="0">
+                        <a:latin typeface="Cambria Math" panose="02040503050406030204" pitchFamily="18" charset="0"/>
+                      </a:rPr>
+                      <m:t>6 = </m:t>
+                    </m:r>
+                    <m:r>
+                      <a:rPr lang="en-US" sz="2400" i="1" dirty="0">
+                        <a:latin typeface="Cambria Math" panose="02040503050406030204" pitchFamily="18" charset="0"/>
+                      </a:rPr>
+                      <m:t>18 + </m:t>
+                    </m:r>
+                    <m:d>
+                      <m:dPr>
+                        <m:ctrlPr>
+                          <a:rPr lang="en-US" sz="2400" i="1" dirty="0">
+                            <a:latin typeface="Cambria Math" panose="02040503050406030204" pitchFamily="18" charset="0"/>
+                          </a:rPr>
+                        </m:ctrlPr>
+                      </m:dPr>
+                      <m:e>
+                        <m:r>
+                          <a:rPr lang="en-US" sz="2400" i="1" dirty="0">
+                            <a:latin typeface="Cambria Math" panose="02040503050406030204" pitchFamily="18" charset="0"/>
+                          </a:rPr>
+                          <m:t>156 </m:t>
+                        </m:r>
+                        <m:r>
+                          <a:rPr lang="en-US" sz="2400" i="1" dirty="0" smtClean="0">
+                            <a:latin typeface="Cambria Math" panose="02040503050406030204" pitchFamily="18" charset="0"/>
+                          </a:rPr>
+                          <m:t>− 18</m:t>
+                        </m:r>
+                        <m:r>
+                          <a:rPr lang="en-MY" sz="2400" b="0" i="1" dirty="0" smtClean="0">
+                            <a:latin typeface="Cambria Math" panose="02040503050406030204" pitchFamily="18" charset="0"/>
+                          </a:rPr>
+                          <m:t>×</m:t>
+                        </m:r>
+                        <m:r>
+                          <a:rPr lang="en-US" sz="2400" i="1" dirty="0" smtClean="0">
+                            <a:latin typeface="Cambria Math" panose="02040503050406030204" pitchFamily="18" charset="0"/>
+                          </a:rPr>
+                          <m:t> </m:t>
+                        </m:r>
+                        <m:r>
+                          <a:rPr lang="en-US" sz="2400" i="1" dirty="0">
+                            <a:latin typeface="Cambria Math" panose="02040503050406030204" pitchFamily="18" charset="0"/>
+                          </a:rPr>
+                          <m:t>8</m:t>
+                        </m:r>
+                      </m:e>
+                    </m:d>
+                    <m:r>
+                      <a:rPr lang="en-MY" sz="2400" b="0" i="1" dirty="0" smtClean="0">
+                        <a:latin typeface="Cambria Math" panose="02040503050406030204" pitchFamily="18" charset="0"/>
+                      </a:rPr>
+                      <m:t>×</m:t>
+                    </m:r>
+                    <m:r>
+                      <a:rPr lang="en-US" sz="2400" i="1" dirty="0" smtClean="0">
+                        <a:latin typeface="Cambria Math" panose="02040503050406030204" pitchFamily="18" charset="0"/>
+                      </a:rPr>
+                      <m:t> </m:t>
+                    </m:r>
+                    <m:d>
+                      <m:dPr>
+                        <m:ctrlPr>
+                          <a:rPr lang="en-US" sz="2400" i="1" dirty="0" smtClean="0">
+                            <a:latin typeface="Cambria Math" panose="02040503050406030204" pitchFamily="18" charset="0"/>
+                          </a:rPr>
+                        </m:ctrlPr>
+                      </m:dPr>
+                      <m:e>
+                        <m:r>
+                          <a:rPr lang="en-US" sz="2400" i="1" dirty="0" smtClean="0">
+                            <a:latin typeface="Cambria Math" panose="02040503050406030204" pitchFamily="18" charset="0"/>
+                          </a:rPr>
+                          <m:t>−1</m:t>
+                        </m:r>
+                      </m:e>
+                    </m:d>
+                    <m:r>
+                      <a:rPr lang="en-US" sz="2400" i="1" dirty="0">
+                        <a:latin typeface="Cambria Math" panose="02040503050406030204" pitchFamily="18" charset="0"/>
+                      </a:rPr>
+                      <m:t>= 156</m:t>
+                    </m:r>
+                    <m:r>
+                      <a:rPr lang="en-MY" sz="2400" b="0" i="1" dirty="0" smtClean="0">
+                        <a:latin typeface="Cambria Math" panose="02040503050406030204" pitchFamily="18" charset="0"/>
+                      </a:rPr>
+                      <m:t>×</m:t>
+                    </m:r>
+                    <m:r>
+                      <a:rPr lang="en-US" sz="2400" i="1" dirty="0" smtClean="0">
+                        <a:latin typeface="Cambria Math" panose="02040503050406030204" pitchFamily="18" charset="0"/>
+                      </a:rPr>
+                      <m:t> </m:t>
+                    </m:r>
+                    <m:d>
+                      <m:dPr>
+                        <m:ctrlPr>
+                          <a:rPr lang="en-US" sz="2400" i="1" dirty="0" smtClean="0">
+                            <a:latin typeface="Cambria Math" panose="02040503050406030204" pitchFamily="18" charset="0"/>
+                          </a:rPr>
+                        </m:ctrlPr>
+                      </m:dPr>
+                      <m:e>
+                        <m:r>
+                          <a:rPr lang="en-US" sz="2400" i="1" dirty="0" smtClean="0">
+                            <a:latin typeface="Cambria Math" panose="02040503050406030204" pitchFamily="18" charset="0"/>
+                          </a:rPr>
+                          <m:t>−1</m:t>
+                        </m:r>
+                      </m:e>
+                    </m:d>
+                    <m:r>
+                      <a:rPr lang="en-US" sz="2400" i="1" dirty="0">
+                        <a:latin typeface="Cambria Math" panose="02040503050406030204" pitchFamily="18" charset="0"/>
+                      </a:rPr>
+                      <m:t>+ 18</m:t>
+                    </m:r>
+                    <m:r>
+                      <a:rPr lang="en-MY" sz="2400" b="0" i="1" dirty="0" smtClean="0">
+                        <a:latin typeface="Cambria Math" panose="02040503050406030204" pitchFamily="18" charset="0"/>
+                      </a:rPr>
+                      <m:t>×</m:t>
+                    </m:r>
+                    <m:r>
+                      <a:rPr lang="en-US" sz="2400" i="1" dirty="0" smtClean="0">
+                        <a:latin typeface="Cambria Math" panose="02040503050406030204" pitchFamily="18" charset="0"/>
+                      </a:rPr>
+                      <m:t> </m:t>
+                    </m:r>
+                    <m:r>
+                      <a:rPr lang="en-US" sz="2400" i="1" dirty="0">
+                        <a:latin typeface="Cambria Math" panose="02040503050406030204" pitchFamily="18" charset="0"/>
+                      </a:rPr>
+                      <m:t>9 </m:t>
+                    </m:r>
+                  </m:oMath>
+                </a14:m>
+                <a:r>
+                  <a:rPr lang="en-US" sz="2400" dirty="0"/>
+                  <a:t>Using (ii)</a:t>
+                </a:r>
+              </a:p>
+              <a:p>
+                <a14:m>
+                  <m:oMath xmlns:m="http://schemas.openxmlformats.org/officeDocument/2006/math">
+                    <m:r>
+                      <a:rPr lang="en-US" sz="2400" i="1" dirty="0" smtClean="0">
+                        <a:latin typeface="Cambria Math" panose="02040503050406030204" pitchFamily="18" charset="0"/>
+                      </a:rPr>
+                      <m:t>6 = </m:t>
+                    </m:r>
+                    <m:r>
+                      <a:rPr lang="en-US" sz="2400" i="1" dirty="0">
+                        <a:latin typeface="Cambria Math" panose="02040503050406030204" pitchFamily="18" charset="0"/>
+                      </a:rPr>
+                      <m:t>156 </m:t>
+                    </m:r>
+                    <m:r>
+                      <a:rPr lang="en-MY" sz="2400" b="0" i="1" dirty="0" smtClean="0">
+                        <a:latin typeface="Cambria Math" panose="02040503050406030204" pitchFamily="18" charset="0"/>
+                      </a:rPr>
+                      <m:t>×</m:t>
+                    </m:r>
+                    <m:r>
+                      <a:rPr lang="en-US" sz="2400" i="1" dirty="0" smtClean="0">
+                        <a:latin typeface="Cambria Math" panose="02040503050406030204" pitchFamily="18" charset="0"/>
+                      </a:rPr>
+                      <m:t> </m:t>
+                    </m:r>
+                    <m:d>
+                      <m:dPr>
+                        <m:ctrlPr>
+                          <a:rPr lang="en-US" sz="2400" i="1" dirty="0" smtClean="0">
+                            <a:latin typeface="Cambria Math" panose="02040503050406030204" pitchFamily="18" charset="0"/>
+                          </a:rPr>
+                        </m:ctrlPr>
+                      </m:dPr>
+                      <m:e>
+                        <m:r>
+                          <a:rPr lang="en-US" sz="2400" i="1" dirty="0" smtClean="0">
+                            <a:latin typeface="Cambria Math" panose="02040503050406030204" pitchFamily="18" charset="0"/>
+                          </a:rPr>
+                          <m:t>−1</m:t>
+                        </m:r>
+                      </m:e>
+                    </m:d>
+                    <m:r>
+                      <a:rPr lang="en-US" sz="2400" i="1" dirty="0">
+                        <a:latin typeface="Cambria Math" panose="02040503050406030204" pitchFamily="18" charset="0"/>
+                      </a:rPr>
+                      <m:t>+ </m:t>
+                    </m:r>
+                    <m:d>
+                      <m:dPr>
+                        <m:ctrlPr>
+                          <a:rPr lang="en-US" sz="2400" i="1" dirty="0">
+                            <a:latin typeface="Cambria Math" panose="02040503050406030204" pitchFamily="18" charset="0"/>
+                          </a:rPr>
+                        </m:ctrlPr>
+                      </m:dPr>
+                      <m:e>
+                        <m:r>
+                          <a:rPr lang="en-US" sz="2400" i="1" dirty="0">
+                            <a:latin typeface="Cambria Math" panose="02040503050406030204" pitchFamily="18" charset="0"/>
+                          </a:rPr>
+                          <m:t>330 </m:t>
+                        </m:r>
+                        <m:r>
+                          <a:rPr lang="en-US" sz="2400" i="1" dirty="0" smtClean="0">
+                            <a:latin typeface="Cambria Math" panose="02040503050406030204" pitchFamily="18" charset="0"/>
+                          </a:rPr>
+                          <m:t>− </m:t>
+                        </m:r>
+                        <m:r>
+                          <a:rPr lang="en-US" sz="2400" i="1" dirty="0">
+                            <a:latin typeface="Cambria Math" panose="02040503050406030204" pitchFamily="18" charset="0"/>
+                          </a:rPr>
+                          <m:t>156</m:t>
+                        </m:r>
+                        <m:r>
+                          <a:rPr lang="en-MY" sz="2400" b="0" i="1" dirty="0" smtClean="0">
+                            <a:latin typeface="Cambria Math" panose="02040503050406030204" pitchFamily="18" charset="0"/>
+                          </a:rPr>
+                          <m:t>×</m:t>
+                        </m:r>
+                        <m:r>
+                          <a:rPr lang="en-US" sz="2400" i="1" dirty="0" smtClean="0">
+                            <a:latin typeface="Cambria Math" panose="02040503050406030204" pitchFamily="18" charset="0"/>
+                          </a:rPr>
+                          <m:t> </m:t>
+                        </m:r>
+                        <m:r>
+                          <a:rPr lang="en-US" sz="2400" i="1" dirty="0">
+                            <a:latin typeface="Cambria Math" panose="02040503050406030204" pitchFamily="18" charset="0"/>
+                          </a:rPr>
+                          <m:t>2</m:t>
+                        </m:r>
+                      </m:e>
+                    </m:d>
+                    <m:r>
+                      <a:rPr lang="en-US" sz="2400" i="1" dirty="0">
+                        <a:latin typeface="Cambria Math" panose="02040503050406030204" pitchFamily="18" charset="0"/>
+                      </a:rPr>
+                      <m:t> 9 = </m:t>
+                    </m:r>
+                    <m:r>
+                      <a:rPr lang="en-US" sz="2400" i="1" dirty="0" smtClean="0">
+                        <a:latin typeface="Cambria Math" panose="02040503050406030204" pitchFamily="18" charset="0"/>
+                      </a:rPr>
+                      <m:t>330</m:t>
+                    </m:r>
+                    <m:r>
+                      <a:rPr lang="en-MY" sz="2400" b="0" i="1" dirty="0" smtClean="0">
+                        <a:latin typeface="Cambria Math" panose="02040503050406030204" pitchFamily="18" charset="0"/>
+                      </a:rPr>
+                      <m:t>×</m:t>
+                    </m:r>
+                    <m:r>
+                      <a:rPr lang="en-US" sz="2400" i="1" dirty="0" smtClean="0">
+                        <a:latin typeface="Cambria Math" panose="02040503050406030204" pitchFamily="18" charset="0"/>
+                      </a:rPr>
+                      <m:t>  </m:t>
+                    </m:r>
+                    <m:r>
+                      <a:rPr lang="en-US" sz="2400" i="1" dirty="0">
+                        <a:latin typeface="Cambria Math" panose="02040503050406030204" pitchFamily="18" charset="0"/>
+                      </a:rPr>
+                      <m:t>9 + 156</m:t>
+                    </m:r>
+                    <m:r>
+                      <a:rPr lang="en-MY" sz="2400" b="0" i="1" dirty="0" smtClean="0">
+                        <a:latin typeface="Cambria Math" panose="02040503050406030204" pitchFamily="18" charset="0"/>
+                      </a:rPr>
+                      <m:t>×</m:t>
+                    </m:r>
+                    <m:r>
+                      <a:rPr lang="en-US" sz="2400" i="1" dirty="0" smtClean="0">
+                        <a:latin typeface="Cambria Math" panose="02040503050406030204" pitchFamily="18" charset="0"/>
+                      </a:rPr>
+                      <m:t>(−19</m:t>
+                    </m:r>
+                    <m:r>
+                      <a:rPr lang="en-US" sz="2400" i="1" dirty="0">
+                        <a:latin typeface="Cambria Math" panose="02040503050406030204" pitchFamily="18" charset="0"/>
+                      </a:rPr>
+                      <m:t>) </m:t>
+                    </m:r>
+                  </m:oMath>
+                </a14:m>
+                <a:r>
+                  <a:rPr lang="en-US" sz="2400" dirty="0"/>
+                  <a:t>Using (</a:t>
+                </a:r>
+                <a:r>
+                  <a:rPr lang="en-US" sz="2400" dirty="0" err="1"/>
+                  <a:t>i</a:t>
+                </a:r>
+                <a:r>
+                  <a:rPr lang="en-US" sz="2400" dirty="0"/>
+                  <a:t>)</a:t>
+                </a:r>
+                <a:endParaRPr lang="en-MY" sz="2400" dirty="0"/>
+              </a:p>
+            </p:txBody>
+          </p:sp>
+        </mc:Choice>
+        <mc:Fallback>
+          <p:sp>
+            <p:nvSpPr>
+              <p:cNvPr id="3" name="Content Placeholder 2">
+                <a:extLst>
+                  <a:ext uri="{FF2B5EF4-FFF2-40B4-BE49-F238E27FC236}">
+                    <a16:creationId xmlns:a16="http://schemas.microsoft.com/office/drawing/2014/main" id="{18468980-FB3A-4E54-9AA9-46B542342893}"/>
+                  </a:ext>
+                </a:extLst>
+              </p:cNvPr>
+              <p:cNvSpPr>
+                <a:spLocks noGrp="1" noRot="1" noChangeAspect="1" noMove="1" noResize="1" noEditPoints="1" noAdjustHandles="1" noChangeArrowheads="1" noChangeShapeType="1" noTextEdit="1"/>
+              </p:cNvSpPr>
+              <p:nvPr>
+                <p:ph idx="1"/>
+              </p:nvPr>
+            </p:nvSpPr>
+            <p:spPr>
+              <a:xfrm>
+                <a:off x="1097279" y="1845733"/>
+                <a:ext cx="10414535" cy="4535815"/>
+              </a:xfrm>
+              <a:blipFill>
+                <a:blip r:embed="rId2"/>
+                <a:stretch>
+                  <a:fillRect l="-1756" t="-1882" r="-1347" b="-1747"/>
+                </a:stretch>
+              </a:blipFill>
+            </p:spPr>
+            <p:txBody>
+              <a:bodyPr/>
+              <a:lstStyle/>
+              <a:p>
+                <a:r>
+                  <a:rPr lang="en-MY">
+                    <a:noFill/>
+                  </a:rPr>
+                  <a:t> </a:t>
+                </a:r>
+              </a:p>
+            </p:txBody>
+          </p:sp>
+        </mc:Fallback>
+      </mc:AlternateContent>
+    </p:spTree>
+    <p:extLst>
+      <p:ext uri="{BB962C8B-B14F-4D97-AF65-F5344CB8AC3E}">
+        <p14:creationId xmlns:p14="http://schemas.microsoft.com/office/powerpoint/2010/main" val="102769259"/>
+      </p:ext>
+    </p:extLst>
+  </p:cSld>
+  <p:clrMapOvr>
+    <a:masterClrMapping/>
+  </p:clrMapOvr>
+</p:sld>
+</file>
+
+<file path=ppt/slides/slide9.xml><?xml version="1.0" encoding="utf-8"?>
+<p:sld xmlns:a="http://schemas.openxmlformats.org/drawingml/2006/main" xmlns:r="http://schemas.openxmlformats.org/officeDocument/2006/relationships" xmlns:p="http://schemas.openxmlformats.org/presentationml/2006/main">
+  <p:cSld>
+    <p:spTree>
+      <p:nvGrpSpPr>
+        <p:cNvPr id="1" name=""/>
+        <p:cNvGrpSpPr/>
+        <p:nvPr/>
+      </p:nvGrpSpPr>
+      <p:grpSpPr>
+        <a:xfrm>
+          <a:off x="0" y="0"/>
+          <a:ext cx="0" cy="0"/>
+          <a:chOff x="0" y="0"/>
+          <a:chExt cx="0" cy="0"/>
+        </a:xfrm>
+      </p:grpSpPr>
+      <p:sp>
+        <p:nvSpPr>
+          <p:cNvPr id="2" name="Title 1">
+            <a:extLst>
+              <a:ext uri="{FF2B5EF4-FFF2-40B4-BE49-F238E27FC236}">
+                <a16:creationId xmlns:a16="http://schemas.microsoft.com/office/drawing/2014/main" id="{0BF8A6EA-C888-49ED-91A0-8DB4D9E5D06A}"/>
+              </a:ext>
+            </a:extLst>
+          </p:cNvPr>
+          <p:cNvSpPr>
+            <a:spLocks noGrp="1"/>
+          </p:cNvSpPr>
+          <p:nvPr>
+            <p:ph type="title"/>
+          </p:nvPr>
+        </p:nvSpPr>
+        <p:spPr/>
+        <p:txBody>
+          <a:bodyPr/>
+          <a:lstStyle/>
+          <a:p>
+            <a:r>
+              <a:rPr lang="en-MY" dirty="0"/>
+              <a:t>Modulo Arithmetic</a:t>
+            </a:r>
+          </a:p>
+        </p:txBody>
+      </p:sp>
+      <mc:AlternateContent xmlns:mc="http://schemas.openxmlformats.org/markup-compatibility/2006">
+        <mc:Choice xmlns:a14="http://schemas.microsoft.com/office/drawing/2010/main" Requires="a14">
+          <p:sp>
+            <p:nvSpPr>
+              <p:cNvPr id="3" name="Content Placeholder 2">
+                <a:extLst>
+                  <a:ext uri="{FF2B5EF4-FFF2-40B4-BE49-F238E27FC236}">
+                    <a16:creationId xmlns:a16="http://schemas.microsoft.com/office/drawing/2014/main" id="{18468980-FB3A-4E54-9AA9-46B542342893}"/>
                   </a:ext>
                 </a:extLst>
               </p:cNvPr>
@@ -5047,160 +6970,268 @@
               <a:lstStyle/>
               <a:p>
                 <a:r>
-                  <a:rPr lang="en-MY" sz="3200" b="0" dirty="0"/>
-                  <a:t>No three positive integers satisfy the equation</a:t>
+                  <a:rPr lang="en-US" sz="3000" dirty="0"/>
+                  <a:t>Let </a:t>
+                </a:r>
+                <a14:m>
+                  <m:oMath xmlns:m="http://schemas.openxmlformats.org/officeDocument/2006/math">
+                    <m:r>
+                      <a:rPr lang="en-US" sz="3000" i="1" dirty="0" smtClean="0">
+                        <a:latin typeface="Cambria Math" panose="02040503050406030204" pitchFamily="18" charset="0"/>
+                      </a:rPr>
+                      <m:t>𝑚</m:t>
+                    </m:r>
+                  </m:oMath>
+                </a14:m>
+                <a:r>
+                  <a:rPr lang="en-US" sz="3000" dirty="0"/>
+                  <a:t> and </a:t>
+                </a:r>
+                <a14:m>
+                  <m:oMath xmlns:m="http://schemas.openxmlformats.org/officeDocument/2006/math">
+                    <m:r>
+                      <a:rPr lang="en-US" sz="3000" i="1" dirty="0" smtClean="0">
+                        <a:latin typeface="Cambria Math" panose="02040503050406030204" pitchFamily="18" charset="0"/>
+                      </a:rPr>
+                      <m:t>𝑛</m:t>
+                    </m:r>
+                  </m:oMath>
+                </a14:m>
+                <a:r>
+                  <a:rPr lang="en-US" sz="3000" dirty="0"/>
+                  <a:t> be integers, and let </a:t>
+                </a:r>
+                <a14:m>
+                  <m:oMath xmlns:m="http://schemas.openxmlformats.org/officeDocument/2006/math">
+                    <m:r>
+                      <a:rPr lang="en-US" sz="3000" i="1" dirty="0" smtClean="0">
+                        <a:latin typeface="Cambria Math" panose="02040503050406030204" pitchFamily="18" charset="0"/>
+                      </a:rPr>
+                      <m:t>𝑑</m:t>
+                    </m:r>
+                  </m:oMath>
+                </a14:m>
+                <a:r>
+                  <a:rPr lang="en-US" sz="3000" dirty="0"/>
+                  <a:t> be a positive integer. We say that </a:t>
+                </a:r>
+                <a14:m>
+                  <m:oMath xmlns:m="http://schemas.openxmlformats.org/officeDocument/2006/math">
+                    <m:r>
+                      <a:rPr lang="en-US" sz="3000" i="1" dirty="0" smtClean="0">
+                        <a:latin typeface="Cambria Math" panose="02040503050406030204" pitchFamily="18" charset="0"/>
+                      </a:rPr>
+                      <m:t>𝑚</m:t>
+                    </m:r>
+                  </m:oMath>
+                </a14:m>
+                <a:r>
+                  <a:rPr lang="en-US" sz="3000" dirty="0"/>
+                  <a:t> is congruent to </a:t>
+                </a:r>
+                <a14:m>
+                  <m:oMath xmlns:m="http://schemas.openxmlformats.org/officeDocument/2006/math">
+                    <m:r>
+                      <a:rPr lang="en-US" sz="3000" i="1" dirty="0" smtClean="0">
+                        <a:latin typeface="Cambria Math" panose="02040503050406030204" pitchFamily="18" charset="0"/>
+                      </a:rPr>
+                      <m:t>𝑛</m:t>
+                    </m:r>
+                    <m:r>
+                      <a:rPr lang="en-US" sz="3000" i="1" dirty="0" smtClean="0">
+                        <a:latin typeface="Cambria Math" panose="02040503050406030204" pitchFamily="18" charset="0"/>
+                      </a:rPr>
+                      <m:t> </m:t>
+                    </m:r>
+                    <m:r>
+                      <a:rPr lang="en-US" sz="3000" i="1" dirty="0" smtClean="0">
+                        <a:latin typeface="Cambria Math" panose="02040503050406030204" pitchFamily="18" charset="0"/>
+                      </a:rPr>
+                      <m:t>𝑚𝑜𝑑𝑢𝑙𝑜</m:t>
+                    </m:r>
+                    <m:r>
+                      <a:rPr lang="en-US" sz="3000" i="1" dirty="0" smtClean="0">
+                        <a:latin typeface="Cambria Math" panose="02040503050406030204" pitchFamily="18" charset="0"/>
+                      </a:rPr>
+                      <m:t> </m:t>
+                    </m:r>
+                    <m:r>
+                      <a:rPr lang="en-MY" sz="3000" i="1" dirty="0" smtClean="0">
+                        <a:latin typeface="Cambria Math" panose="02040503050406030204" pitchFamily="18" charset="0"/>
+                      </a:rPr>
+                      <m:t>𝑑</m:t>
+                    </m:r>
+                  </m:oMath>
+                </a14:m>
+                <a:r>
+                  <a:rPr lang="en-MY" sz="3000" dirty="0"/>
+                  <a:t>, and write:</a:t>
                 </a:r>
               </a:p>
               <a:p>
-                <a:r>
-                  <a:rPr lang="en-MY" sz="3200" b="0" dirty="0"/>
-                  <a:t> </a:t>
-                </a:r>
+                <a:endParaRPr lang="en-MY" sz="3000" dirty="0"/>
+              </a:p>
+              <a:p>
+                <a:pPr marL="0" indent="0" algn="ctr">
+                  <a:buNone/>
+                </a:pPr>
                 <a14:m>
                   <m:oMath xmlns:m="http://schemas.openxmlformats.org/officeDocument/2006/math">
-                    <m:sSup>
-                      <m:sSupPr>
-                        <m:ctrlPr>
-                          <a:rPr lang="en-MY" sz="3200" b="0" i="1" smtClean="0">
-                            <a:latin typeface="Cambria Math" panose="02040503050406030204" pitchFamily="18" charset="0"/>
-                          </a:rPr>
-                        </m:ctrlPr>
-                      </m:sSupPr>
-                      <m:e>
-                        <m:r>
-                          <a:rPr lang="en-MY" sz="3200" b="0" i="1" smtClean="0">
-                            <a:latin typeface="Cambria Math" panose="02040503050406030204" pitchFamily="18" charset="0"/>
-                          </a:rPr>
-                          <m:t>𝑎</m:t>
-                        </m:r>
-                      </m:e>
-                      <m:sup>
-                        <m:r>
-                          <a:rPr lang="en-MY" sz="3200" b="0" i="1" smtClean="0">
-                            <a:latin typeface="Cambria Math" panose="02040503050406030204" pitchFamily="18" charset="0"/>
-                          </a:rPr>
-                          <m:t>𝑛</m:t>
-                        </m:r>
-                      </m:sup>
-                    </m:sSup>
-                    <m:r>
-                      <a:rPr lang="en-MY" sz="3200" b="0" i="1" smtClean="0">
-                        <a:latin typeface="Cambria Math" panose="02040503050406030204" pitchFamily="18" charset="0"/>
-                      </a:rPr>
-                      <m:t>+</m:t>
-                    </m:r>
-                    <m:sSup>
-                      <m:sSupPr>
-                        <m:ctrlPr>
-                          <a:rPr lang="en-MY" sz="3200" b="0" i="1" smtClean="0">
-                            <a:latin typeface="Cambria Math" panose="02040503050406030204" pitchFamily="18" charset="0"/>
-                          </a:rPr>
-                        </m:ctrlPr>
-                      </m:sSupPr>
-                      <m:e>
-                        <m:r>
-                          <a:rPr lang="en-MY" sz="3200" b="0" i="1" smtClean="0">
-                            <a:latin typeface="Cambria Math" panose="02040503050406030204" pitchFamily="18" charset="0"/>
-                          </a:rPr>
-                          <m:t>𝑏</m:t>
-                        </m:r>
-                      </m:e>
-                      <m:sup>
-                        <m:r>
-                          <a:rPr lang="en-MY" sz="3200" b="0" i="1" smtClean="0">
-                            <a:latin typeface="Cambria Math" panose="02040503050406030204" pitchFamily="18" charset="0"/>
-                          </a:rPr>
-                          <m:t>𝑛</m:t>
-                        </m:r>
-                      </m:sup>
-                    </m:sSup>
-                    <m:r>
-                      <a:rPr lang="en-MY" sz="3200" b="0" i="1" smtClean="0">
-                        <a:latin typeface="Cambria Math" panose="02040503050406030204" pitchFamily="18" charset="0"/>
-                      </a:rPr>
-                      <m:t>=</m:t>
-                    </m:r>
-                    <m:sSup>
-                      <m:sSupPr>
-                        <m:ctrlPr>
-                          <a:rPr lang="en-MY" sz="3200" b="0" i="1" smtClean="0">
-                            <a:latin typeface="Cambria Math" panose="02040503050406030204" pitchFamily="18" charset="0"/>
-                          </a:rPr>
-                        </m:ctrlPr>
-                      </m:sSupPr>
-                      <m:e>
-                        <m:r>
-                          <a:rPr lang="en-MY" sz="3200" b="0" i="1" smtClean="0">
-                            <a:latin typeface="Cambria Math" panose="02040503050406030204" pitchFamily="18" charset="0"/>
-                          </a:rPr>
-                          <m:t>𝑐</m:t>
-                        </m:r>
-                      </m:e>
-                      <m:sup>
-                        <m:r>
-                          <a:rPr lang="en-MY" sz="3200" b="0" i="1" smtClean="0">
-                            <a:latin typeface="Cambria Math" panose="02040503050406030204" pitchFamily="18" charset="0"/>
-                          </a:rPr>
-                          <m:t>𝑛</m:t>
-                        </m:r>
-                      </m:sup>
-                    </m:sSup>
+                    <m:r>
+                      <a:rPr lang="en-MY" sz="3000" b="0" i="1" smtClean="0">
+                        <a:latin typeface="Cambria Math" panose="02040503050406030204" pitchFamily="18" charset="0"/>
+                      </a:rPr>
+                      <m:t>𝑚</m:t>
+                    </m:r>
+                    <m:r>
+                      <a:rPr lang="en-MY" sz="3000" b="0" i="1" smtClean="0">
+                        <a:latin typeface="Cambria Math" panose="02040503050406030204" pitchFamily="18" charset="0"/>
+                      </a:rPr>
+                      <m:t>≡</m:t>
+                    </m:r>
+                    <m:r>
+                      <a:rPr lang="en-MY" sz="3000" b="0" i="1" smtClean="0">
+                        <a:latin typeface="Cambria Math" panose="02040503050406030204" pitchFamily="18" charset="0"/>
+                      </a:rPr>
+                      <m:t>𝑛</m:t>
+                    </m:r>
+                    <m:r>
+                      <a:rPr lang="en-MY" sz="3000" b="0" i="1" smtClean="0">
+                        <a:latin typeface="Cambria Math" panose="02040503050406030204" pitchFamily="18" charset="0"/>
+                      </a:rPr>
+                      <m:t> </m:t>
+                    </m:r>
                   </m:oMath>
                 </a14:m>
                 <a:r>
-                  <a:rPr lang="en-MY" sz="3200" dirty="0"/>
-                  <a:t> , where </a:t>
+                  <a:rPr lang="en-MY" sz="3000" dirty="0"/>
+                  <a:t>(mod d) </a:t>
                 </a:r>
                 <a14:m>
                   <m:oMath xmlns:m="http://schemas.openxmlformats.org/officeDocument/2006/math">
                     <m:r>
-                      <a:rPr lang="en-MY" sz="3200" b="0" i="1" smtClean="0">
-                        <a:latin typeface="Cambria Math" panose="02040503050406030204" pitchFamily="18" charset="0"/>
+                      <a:rPr lang="en-MY" sz="3000" b="0" i="1" smtClean="0">
+                        <a:latin typeface="Cambria Math" panose="02040503050406030204" pitchFamily="18" charset="0"/>
+                        <a:ea typeface="Cambria Math" panose="02040503050406030204" pitchFamily="18" charset="0"/>
+                      </a:rPr>
+                      <m:t>⟺</m:t>
+                    </m:r>
+                    <m:r>
+                      <a:rPr lang="en-MY" sz="3000" b="0" i="1" smtClean="0">
+                        <a:latin typeface="Cambria Math" panose="02040503050406030204" pitchFamily="18" charset="0"/>
+                        <a:ea typeface="Cambria Math" panose="02040503050406030204" pitchFamily="18" charset="0"/>
+                      </a:rPr>
+                      <m:t>𝑑</m:t>
+                    </m:r>
+                    <m:r>
+                      <a:rPr lang="en-MY" sz="3000" b="0" i="1" smtClean="0">
+                        <a:latin typeface="Cambria Math" panose="02040503050406030204" pitchFamily="18" charset="0"/>
+                        <a:ea typeface="Cambria Math" panose="02040503050406030204" pitchFamily="18" charset="0"/>
+                      </a:rPr>
+                      <m:t> | (</m:t>
+                    </m:r>
+                    <m:r>
+                      <a:rPr lang="en-MY" sz="3000" b="0" i="1" smtClean="0">
+                        <a:latin typeface="Cambria Math" panose="02040503050406030204" pitchFamily="18" charset="0"/>
+                        <a:ea typeface="Cambria Math" panose="02040503050406030204" pitchFamily="18" charset="0"/>
+                      </a:rPr>
+                      <m:t>𝑚</m:t>
+                    </m:r>
+                    <m:r>
+                      <a:rPr lang="en-MY" sz="3000" b="0" i="1" smtClean="0">
+                        <a:latin typeface="Cambria Math" panose="02040503050406030204" pitchFamily="18" charset="0"/>
+                        <a:ea typeface="Cambria Math" panose="02040503050406030204" pitchFamily="18" charset="0"/>
+                      </a:rPr>
+                      <m:t> −</m:t>
+                    </m:r>
+                    <m:r>
+                      <a:rPr lang="en-MY" sz="3000" b="0" i="1" smtClean="0">
+                        <a:latin typeface="Cambria Math" panose="02040503050406030204" pitchFamily="18" charset="0"/>
+                        <a:ea typeface="Cambria Math" panose="02040503050406030204" pitchFamily="18" charset="0"/>
                       </a:rPr>
                       <m:t>𝑛</m:t>
                     </m:r>
                     <m:r>
-                      <a:rPr lang="en-MY" sz="3200" b="0" i="1" smtClean="0">
-                        <a:latin typeface="Cambria Math" panose="02040503050406030204" pitchFamily="18" charset="0"/>
-                      </a:rPr>
-                      <m:t>≥2</m:t>
+                      <a:rPr lang="en-MY" sz="3000" b="0" i="1" smtClean="0">
+                        <a:latin typeface="Cambria Math" panose="02040503050406030204" pitchFamily="18" charset="0"/>
+                        <a:ea typeface="Cambria Math" panose="02040503050406030204" pitchFamily="18" charset="0"/>
+                      </a:rPr>
+                      <m:t>)</m:t>
                     </m:r>
                   </m:oMath>
                 </a14:m>
-                <a:br>
-                  <a:rPr lang="en-MY" sz="3200" dirty="0"/>
-                </a:br>
-                <a:endParaRPr lang="en-MY" sz="3200" dirty="0"/>
+                <a:endParaRPr lang="en-MY" sz="3000" dirty="0"/>
               </a:p>
               <a:p>
-                <a:r>
-                  <a:rPr lang="en-MY" sz="3200" dirty="0"/>
-                  <a:t>Conjectured in 1637</a:t>
+                <a:pPr marL="0" indent="0">
+                  <a:buNone/>
+                </a:pPr>
+                <a:r>
+                  <a:rPr lang="en-MY" sz="3000" dirty="0"/>
+                  <a:t>The congruence itself implies that all of the integers are the same as one of the modulo-</a:t>
+                </a:r>
+                <a14:m>
+                  <m:oMath xmlns:m="http://schemas.openxmlformats.org/officeDocument/2006/math">
+                    <m:r>
+                      <a:rPr lang="en-MY" sz="3000" b="0" i="1" smtClean="0">
+                        <a:latin typeface="Cambria Math" panose="02040503050406030204" pitchFamily="18" charset="0"/>
+                      </a:rPr>
+                      <m:t>𝑑</m:t>
+                    </m:r>
+                  </m:oMath>
+                </a14:m>
+                <a:r>
+                  <a:rPr lang="en-MY" sz="3000" dirty="0"/>
+                  <a:t> residues</a:t>
                 </a:r>
               </a:p>
               <a:p>
-                <a:r>
-                  <a:rPr lang="en-MY" sz="3200" dirty="0"/>
-                  <a:t>Proven in 1995</a:t>
-                </a:r>
-              </a:p>
-              <a:p>
-                <a:r>
-                  <a:rPr lang="en-US" i="1" dirty="0"/>
-                  <a:t> I have discovered a truly marvelous proof of this, which this margin is too narrow to contain.</a:t>
-                </a:r>
-                <a:endParaRPr lang="en-MY" sz="3200" dirty="0"/>
+                <a:pPr marL="0" indent="0" algn="ctr">
+                  <a:buNone/>
+                </a:pPr>
+                <a:r>
+                  <a:rPr lang="en-MY" sz="3000" dirty="0"/>
+                  <a:t>e.g. </a:t>
+                </a:r>
+                <a14:m>
+                  <m:oMath xmlns:m="http://schemas.openxmlformats.org/officeDocument/2006/math">
+                    <m:r>
+                      <a:rPr lang="en-MY" sz="3000" b="0" i="1" smtClean="0">
+                        <a:latin typeface="Cambria Math" panose="02040503050406030204" pitchFamily="18" charset="0"/>
+                      </a:rPr>
+                      <m:t>2≡7≡12 </m:t>
+                    </m:r>
+                  </m:oMath>
+                </a14:m>
+                <a:r>
+                  <a:rPr lang="en-MY" sz="3000" dirty="0"/>
+                  <a:t>(mod </a:t>
+                </a:r>
+                <a14:m>
+                  <m:oMath xmlns:m="http://schemas.openxmlformats.org/officeDocument/2006/math">
+                    <m:r>
+                      <a:rPr lang="en-MY" sz="3000" b="0" i="1" smtClean="0">
+                        <a:latin typeface="Cambria Math" panose="02040503050406030204" pitchFamily="18" charset="0"/>
+                      </a:rPr>
+                      <m:t>5</m:t>
+                    </m:r>
+                  </m:oMath>
+                </a14:m>
+                <a:r>
+                  <a:rPr lang="en-MY" sz="3000" dirty="0"/>
+                  <a:t>)</a:t>
+                </a:r>
               </a:p>
             </p:txBody>
           </p:sp>
         </mc:Choice>
-        <mc:Fallback xmlns="">
+        <mc:Fallback>
           <p:sp>
             <p:nvSpPr>
               <p:cNvPr id="3" name="Content Placeholder 2">
                 <a:extLst>
                   <a:ext uri="{FF2B5EF4-FFF2-40B4-BE49-F238E27FC236}">
-                    <a16:creationId xmlns:a16="http://schemas.microsoft.com/office/drawing/2014/main" id="{0B23BD6D-0666-47AA-AFFE-C027E4D74B59}"/>
+                    <a16:creationId xmlns:a16="http://schemas.microsoft.com/office/drawing/2014/main" id="{18468980-FB3A-4E54-9AA9-46B542342893}"/>
                   </a:ext>
                 </a:extLst>
               </p:cNvPr>
@@ -5215,7 +7246,7 @@
               <a:blipFill>
                 <a:blip r:embed="rId2"/>
                 <a:stretch>
-                  <a:fillRect l="-1515" t="-3182"/>
+                  <a:fillRect l="-2303" t="-3030" r="-364"/>
                 </a:stretch>
               </a:blipFill>
             </p:spPr>
@@ -5237,7 +7268,7 @@
     </p:spTree>
     <p:extLst>
       <p:ext uri="{BB962C8B-B14F-4D97-AF65-F5344CB8AC3E}">
-        <p14:creationId xmlns:p14="http://schemas.microsoft.com/office/powerpoint/2010/main" val="3631621669"/>
+        <p14:creationId xmlns:p14="http://schemas.microsoft.com/office/powerpoint/2010/main" val="3498057022"/>
       </p:ext>
     </p:extLst>
   </p:cSld>

</xml_diff>